<commit_message>
updates for the Ottawa training
</commit_message>
<xml_diff>
--- a/slides/Intro to MCSDK.pptx
+++ b/slides/Intro to MCSDK.pptx
@@ -5,10 +5,10 @@
     <p:sldMasterId id="2147483648" r:id="rId1"/>
   </p:sldMasterIdLst>
   <p:notesMasterIdLst>
-    <p:notesMasterId r:id="rId18"/>
+    <p:notesMasterId r:id="rId16"/>
   </p:notesMasterIdLst>
   <p:handoutMasterIdLst>
-    <p:handoutMasterId r:id="rId19"/>
+    <p:handoutMasterId r:id="rId17"/>
   </p:handoutMasterIdLst>
   <p:sldIdLst>
     <p:sldId id="261" r:id="rId2"/>
@@ -24,14 +24,12 @@
     <p:sldId id="270" r:id="rId12"/>
     <p:sldId id="281" r:id="rId13"/>
     <p:sldId id="274" r:id="rId14"/>
-    <p:sldId id="282" r:id="rId15"/>
-    <p:sldId id="278" r:id="rId16"/>
-    <p:sldId id="275" r:id="rId17"/>
+    <p:sldId id="275" r:id="rId15"/>
   </p:sldIdLst>
   <p:sldSz cx="9144000" cy="6858000" type="screen4x3"/>
   <p:notesSz cx="7315200" cy="9601200"/>
   <p:custDataLst>
-    <p:tags r:id="rId20"/>
+    <p:tags r:id="rId18"/>
   </p:custDataLst>
   <p:defaultTextStyle>
     <a:defPPr>
@@ -274,7 +272,7 @@
               <a:pPr>
                 <a:defRPr/>
               </a:pPr>
-              <a:t>3/22/2012</a:t>
+              <a:t>5/2/2012</a:t>
             </a:fld>
             <a:endParaRPr lang="en-US"/>
           </a:p>
@@ -496,7 +494,7 @@
               <a:pPr>
                 <a:defRPr/>
               </a:pPr>
-              <a:t>3/22/2012</a:t>
+              <a:t>5/2/2012</a:t>
             </a:fld>
             <a:endParaRPr lang="en-US"/>
           </a:p>
@@ -1283,144 +1281,6 @@
 </file>
 
 <file path=ppt/notesSlides/notesSlide14.xml><?xml version="1.0" encoding="utf-8"?>
-<p:notes xmlns:a="http://schemas.openxmlformats.org/drawingml/2006/main" xmlns:r="http://schemas.openxmlformats.org/officeDocument/2006/relationships" xmlns:p="http://schemas.openxmlformats.org/presentationml/2006/main">
-  <p:cSld>
-    <p:spTree>
-      <p:nvGrpSpPr>
-        <p:cNvPr id="1" name=""/>
-        <p:cNvGrpSpPr/>
-        <p:nvPr/>
-      </p:nvGrpSpPr>
-      <p:grpSpPr>
-        <a:xfrm>
-          <a:off x="0" y="0"/>
-          <a:ext cx="0" cy="0"/>
-          <a:chOff x="0" y="0"/>
-          <a:chExt cx="0" cy="0"/>
-        </a:xfrm>
-      </p:grpSpPr>
-      <p:sp>
-        <p:nvSpPr>
-          <p:cNvPr id="246786" name="Rectangle 2"/>
-          <p:cNvSpPr>
-            <a:spLocks noGrp="1" noRot="1" noChangeAspect="1" noTextEdit="1"/>
-          </p:cNvSpPr>
-          <p:nvPr>
-            <p:ph type="sldImg"/>
-          </p:nvPr>
-        </p:nvSpPr>
-        <p:spPr bwMode="auto">
-          <a:noFill/>
-          <a:ln>
-            <a:solidFill>
-              <a:srgbClr val="000000"/>
-            </a:solidFill>
-            <a:miter lim="800000"/>
-            <a:headEnd/>
-            <a:tailEnd/>
-          </a:ln>
-        </p:spPr>
-      </p:sp>
-      <p:sp>
-        <p:nvSpPr>
-          <p:cNvPr id="246787" name="Rectangle 3"/>
-          <p:cNvSpPr>
-            <a:spLocks noGrp="1"/>
-          </p:cNvSpPr>
-          <p:nvPr>
-            <p:ph type="body" idx="1"/>
-          </p:nvPr>
-        </p:nvSpPr>
-        <p:spPr>
-          <a:noFill/>
-          <a:ln/>
-        </p:spPr>
-        <p:txBody>
-          <a:bodyPr/>
-          <a:lstStyle/>
-          <a:p>
-            <a:endParaRPr lang="en-US" smtClean="0"/>
-          </a:p>
-        </p:txBody>
-      </p:sp>
-    </p:spTree>
-  </p:cSld>
-  <p:clrMapOvr>
-    <a:masterClrMapping/>
-  </p:clrMapOvr>
-</p:notes>
-</file>
-
-<file path=ppt/notesSlides/notesSlide15.xml><?xml version="1.0" encoding="utf-8"?>
-<p:notes xmlns:a="http://schemas.openxmlformats.org/drawingml/2006/main" xmlns:r="http://schemas.openxmlformats.org/officeDocument/2006/relationships" xmlns:p="http://schemas.openxmlformats.org/presentationml/2006/main">
-  <p:cSld>
-    <p:spTree>
-      <p:nvGrpSpPr>
-        <p:cNvPr id="1" name=""/>
-        <p:cNvGrpSpPr/>
-        <p:nvPr/>
-      </p:nvGrpSpPr>
-      <p:grpSpPr>
-        <a:xfrm>
-          <a:off x="0" y="0"/>
-          <a:ext cx="0" cy="0"/>
-          <a:chOff x="0" y="0"/>
-          <a:chExt cx="0" cy="0"/>
-        </a:xfrm>
-      </p:grpSpPr>
-      <p:sp>
-        <p:nvSpPr>
-          <p:cNvPr id="251906" name="Rectangle 2"/>
-          <p:cNvSpPr>
-            <a:spLocks noGrp="1" noRot="1" noChangeAspect="1" noTextEdit="1"/>
-          </p:cNvSpPr>
-          <p:nvPr>
-            <p:ph type="sldImg"/>
-          </p:nvPr>
-        </p:nvSpPr>
-        <p:spPr bwMode="auto">
-          <a:noFill/>
-          <a:ln>
-            <a:solidFill>
-              <a:srgbClr val="000000"/>
-            </a:solidFill>
-            <a:miter lim="800000"/>
-            <a:headEnd/>
-            <a:tailEnd/>
-          </a:ln>
-        </p:spPr>
-      </p:sp>
-      <p:sp>
-        <p:nvSpPr>
-          <p:cNvPr id="251907" name="Rectangle 3"/>
-          <p:cNvSpPr>
-            <a:spLocks noGrp="1"/>
-          </p:cNvSpPr>
-          <p:nvPr>
-            <p:ph type="body" idx="1"/>
-          </p:nvPr>
-        </p:nvSpPr>
-        <p:spPr>
-          <a:noFill/>
-          <a:ln/>
-        </p:spPr>
-        <p:txBody>
-          <a:bodyPr/>
-          <a:lstStyle/>
-          <a:p>
-            <a:endParaRPr lang="en-US" smtClean="0"/>
-          </a:p>
-        </p:txBody>
-      </p:sp>
-    </p:spTree>
-  </p:cSld>
-  <p:clrMapOvr>
-    <a:masterClrMapping/>
-  </p:clrMapOvr>
-</p:notes>
-</file>
-
-<file path=ppt/notesSlides/notesSlide16.xml><?xml version="1.0" encoding="utf-8"?>
 <p:notes xmlns:a="http://schemas.openxmlformats.org/drawingml/2006/main" xmlns:r="http://schemas.openxmlformats.org/officeDocument/2006/relationships" xmlns:p="http://schemas.openxmlformats.org/presentationml/2006/main">
   <p:cSld>
     <p:spTree>
@@ -3974,13 +3834,8 @@
             <a:pPr eaLnBrk="1" hangingPunct="1"/>
             <a:r>
               <a:rPr lang="en-US" sz="3600" smtClean="0"/>
-              <a:t>Introduction to the </a:t>
+              <a:t>Introduction to the MCSDK</a:t>
             </a:r>
-            <a:r>
-              <a:rPr lang="en-US" sz="3600" smtClean="0"/>
-              <a:t>MCSDK</a:t>
-            </a:r>
-            <a:endParaRPr lang="en-US" sz="3600" smtClean="0"/>
           </a:p>
         </p:txBody>
       </p:sp>
@@ -7921,144 +7776,6 @@
           <a:effectLst/>
         </p:spPr>
       </p:pic>
-      <p:sp>
-        <p:nvSpPr>
-          <p:cNvPr id="20" name="Rectangle 19"/>
-          <p:cNvSpPr/>
-          <p:nvPr/>
-        </p:nvSpPr>
-        <p:spPr>
-          <a:xfrm>
-            <a:off x="3276600" y="914400"/>
-            <a:ext cx="2331720" cy="5321808"/>
-          </a:xfrm>
-          <a:prstGeom prst="rect">
-            <a:avLst/>
-          </a:prstGeom>
-          <a:noFill/>
-          <a:ln w="50800">
-            <a:solidFill>
-              <a:srgbClr val="FFFF00"/>
-            </a:solidFill>
-          </a:ln>
-        </p:spPr>
-        <p:style>
-          <a:lnRef idx="2">
-            <a:schemeClr val="accent1">
-              <a:shade val="50000"/>
-            </a:schemeClr>
-          </a:lnRef>
-          <a:fillRef idx="1">
-            <a:schemeClr val="accent1"/>
-          </a:fillRef>
-          <a:effectRef idx="0">
-            <a:schemeClr val="accent1"/>
-          </a:effectRef>
-          <a:fontRef idx="minor">
-            <a:schemeClr val="lt1"/>
-          </a:fontRef>
-        </p:style>
-        <p:txBody>
-          <a:bodyPr rtlCol="0" anchor="ctr"/>
-          <a:lstStyle/>
-          <a:p>
-            <a:pPr algn="ctr"/>
-            <a:endParaRPr lang="en-US"/>
-          </a:p>
-        </p:txBody>
-      </p:sp>
-      <p:sp>
-        <p:nvSpPr>
-          <p:cNvPr id="21" name="Rectangle 20"/>
-          <p:cNvSpPr/>
-          <p:nvPr/>
-        </p:nvSpPr>
-        <p:spPr>
-          <a:xfrm>
-            <a:off x="6019800" y="533400"/>
-            <a:ext cx="2304288" cy="5660136"/>
-          </a:xfrm>
-          <a:prstGeom prst="rect">
-            <a:avLst/>
-          </a:prstGeom>
-          <a:noFill/>
-          <a:ln w="50800">
-            <a:solidFill>
-              <a:srgbClr val="FFFF00"/>
-            </a:solidFill>
-          </a:ln>
-        </p:spPr>
-        <p:style>
-          <a:lnRef idx="2">
-            <a:schemeClr val="accent1">
-              <a:shade val="50000"/>
-            </a:schemeClr>
-          </a:lnRef>
-          <a:fillRef idx="1">
-            <a:schemeClr val="accent1"/>
-          </a:fillRef>
-          <a:effectRef idx="0">
-            <a:schemeClr val="accent1"/>
-          </a:effectRef>
-          <a:fontRef idx="minor">
-            <a:schemeClr val="lt1"/>
-          </a:fontRef>
-        </p:style>
-        <p:txBody>
-          <a:bodyPr rtlCol="0" anchor="ctr"/>
-          <a:lstStyle/>
-          <a:p>
-            <a:pPr algn="ctr"/>
-            <a:endParaRPr lang="en-US"/>
-          </a:p>
-        </p:txBody>
-      </p:sp>
-      <p:sp>
-        <p:nvSpPr>
-          <p:cNvPr id="22" name="Rectangle 21"/>
-          <p:cNvSpPr/>
-          <p:nvPr/>
-        </p:nvSpPr>
-        <p:spPr>
-          <a:xfrm>
-            <a:off x="762000" y="1371600"/>
-            <a:ext cx="2057400" cy="4370832"/>
-          </a:xfrm>
-          <a:prstGeom prst="rect">
-            <a:avLst/>
-          </a:prstGeom>
-          <a:noFill/>
-          <a:ln w="50800">
-            <a:solidFill>
-              <a:srgbClr val="FFFF00"/>
-            </a:solidFill>
-          </a:ln>
-        </p:spPr>
-        <p:style>
-          <a:lnRef idx="2">
-            <a:schemeClr val="accent1">
-              <a:shade val="50000"/>
-            </a:schemeClr>
-          </a:lnRef>
-          <a:fillRef idx="1">
-            <a:schemeClr val="accent1"/>
-          </a:fillRef>
-          <a:effectRef idx="0">
-            <a:schemeClr val="accent1"/>
-          </a:effectRef>
-          <a:fontRef idx="minor">
-            <a:schemeClr val="lt1"/>
-          </a:fontRef>
-        </p:style>
-        <p:txBody>
-          <a:bodyPr rtlCol="0" anchor="ctr"/>
-          <a:lstStyle/>
-          <a:p>
-            <a:pPr algn="ctr"/>
-            <a:endParaRPr lang="en-US"/>
-          </a:p>
-        </p:txBody>
-      </p:sp>
     </p:spTree>
     <p:custDataLst>
       <p:tags r:id="rId1"/>
@@ -8070,250 +7787,9 @@
   <p:timing>
     <p:tnLst>
       <p:par>
-        <p:cTn id="1" dur="indefinite" restart="never" nodeType="tmRoot">
-          <p:childTnLst>
-            <p:seq concurrent="1" nextAc="seek">
-              <p:cTn id="2" dur="indefinite" nodeType="mainSeq">
-                <p:childTnLst>
-                  <p:par>
-                    <p:cTn id="3" fill="hold">
-                      <p:stCondLst>
-                        <p:cond delay="indefinite"/>
-                      </p:stCondLst>
-                      <p:childTnLst>
-                        <p:par>
-                          <p:cTn id="4" fill="hold">
-                            <p:stCondLst>
-                              <p:cond delay="0"/>
-                            </p:stCondLst>
-                            <p:childTnLst>
-                              <p:par>
-                                <p:cTn id="5" presetID="10" presetClass="entr" presetSubtype="0" fill="hold" grpId="0" nodeType="clickEffect">
-                                  <p:stCondLst>
-                                    <p:cond delay="0"/>
-                                  </p:stCondLst>
-                                  <p:childTnLst>
-                                    <p:set>
-                                      <p:cBhvr>
-                                        <p:cTn id="6" dur="1" fill="hold">
-                                          <p:stCondLst>
-                                            <p:cond delay="0"/>
-                                          </p:stCondLst>
-                                        </p:cTn>
-                                        <p:tgtEl>
-                                          <p:spTgt spid="20"/>
-                                        </p:tgtEl>
-                                        <p:attrNameLst>
-                                          <p:attrName>style.visibility</p:attrName>
-                                        </p:attrNameLst>
-                                      </p:cBhvr>
-                                      <p:to>
-                                        <p:strVal val="visible"/>
-                                      </p:to>
-                                    </p:set>
-                                    <p:animEffect transition="in" filter="fade">
-                                      <p:cBhvr>
-                                        <p:cTn id="7" dur="2000"/>
-                                        <p:tgtEl>
-                                          <p:spTgt spid="20"/>
-                                        </p:tgtEl>
-                                      </p:cBhvr>
-                                    </p:animEffect>
-                                  </p:childTnLst>
-                                </p:cTn>
-                              </p:par>
-                              <p:par>
-                                <p:cTn id="8" presetID="10" presetClass="entr" presetSubtype="0" fill="hold" grpId="0" nodeType="withEffect">
-                                  <p:stCondLst>
-                                    <p:cond delay="0"/>
-                                  </p:stCondLst>
-                                  <p:childTnLst>
-                                    <p:set>
-                                      <p:cBhvr>
-                                        <p:cTn id="9" dur="1" fill="hold">
-                                          <p:stCondLst>
-                                            <p:cond delay="0"/>
-                                          </p:stCondLst>
-                                        </p:cTn>
-                                        <p:tgtEl>
-                                          <p:spTgt spid="21"/>
-                                        </p:tgtEl>
-                                        <p:attrNameLst>
-                                          <p:attrName>style.visibility</p:attrName>
-                                        </p:attrNameLst>
-                                      </p:cBhvr>
-                                      <p:to>
-                                        <p:strVal val="visible"/>
-                                      </p:to>
-                                    </p:set>
-                                    <p:animEffect transition="in" filter="fade">
-                                      <p:cBhvr>
-                                        <p:cTn id="10" dur="2000"/>
-                                        <p:tgtEl>
-                                          <p:spTgt spid="21"/>
-                                        </p:tgtEl>
-                                      </p:cBhvr>
-                                    </p:animEffect>
-                                  </p:childTnLst>
-                                </p:cTn>
-                              </p:par>
-                            </p:childTnLst>
-                          </p:cTn>
-                        </p:par>
-                      </p:childTnLst>
-                    </p:cTn>
-                  </p:par>
-                  <p:par>
-                    <p:cTn id="11" fill="hold">
-                      <p:stCondLst>
-                        <p:cond delay="indefinite"/>
-                      </p:stCondLst>
-                      <p:childTnLst>
-                        <p:par>
-                          <p:cTn id="12" fill="hold">
-                            <p:stCondLst>
-                              <p:cond delay="0"/>
-                            </p:stCondLst>
-                            <p:childTnLst>
-                              <p:par>
-                                <p:cTn id="13" presetID="10" presetClass="entr" presetSubtype="0" fill="hold" grpId="0" nodeType="clickEffect">
-                                  <p:stCondLst>
-                                    <p:cond delay="0"/>
-                                  </p:stCondLst>
-                                  <p:childTnLst>
-                                    <p:set>
-                                      <p:cBhvr>
-                                        <p:cTn id="14" dur="1" fill="hold">
-                                          <p:stCondLst>
-                                            <p:cond delay="0"/>
-                                          </p:stCondLst>
-                                        </p:cTn>
-                                        <p:tgtEl>
-                                          <p:spTgt spid="22"/>
-                                        </p:tgtEl>
-                                        <p:attrNameLst>
-                                          <p:attrName>style.visibility</p:attrName>
-                                        </p:attrNameLst>
-                                      </p:cBhvr>
-                                      <p:to>
-                                        <p:strVal val="visible"/>
-                                      </p:to>
-                                    </p:set>
-                                    <p:animEffect transition="in" filter="fade">
-                                      <p:cBhvr>
-                                        <p:cTn id="15" dur="2000"/>
-                                        <p:tgtEl>
-                                          <p:spTgt spid="22"/>
-                                        </p:tgtEl>
-                                      </p:cBhvr>
-                                    </p:animEffect>
-                                  </p:childTnLst>
-                                </p:cTn>
-                              </p:par>
-                              <p:par>
-                                <p:cTn id="16" presetID="10" presetClass="exit" presetSubtype="0" fill="hold" grpId="1" nodeType="withEffect">
-                                  <p:stCondLst>
-                                    <p:cond delay="0"/>
-                                  </p:stCondLst>
-                                  <p:childTnLst>
-                                    <p:animEffect transition="out" filter="fade">
-                                      <p:cBhvr>
-                                        <p:cTn id="17" dur="2000"/>
-                                        <p:tgtEl>
-                                          <p:spTgt spid="20"/>
-                                        </p:tgtEl>
-                                      </p:cBhvr>
-                                    </p:animEffect>
-                                    <p:set>
-                                      <p:cBhvr>
-                                        <p:cTn id="18" dur="1" fill="hold">
-                                          <p:stCondLst>
-                                            <p:cond delay="1999"/>
-                                          </p:stCondLst>
-                                        </p:cTn>
-                                        <p:tgtEl>
-                                          <p:spTgt spid="20"/>
-                                        </p:tgtEl>
-                                        <p:attrNameLst>
-                                          <p:attrName>style.visibility</p:attrName>
-                                        </p:attrNameLst>
-                                      </p:cBhvr>
-                                      <p:to>
-                                        <p:strVal val="hidden"/>
-                                      </p:to>
-                                    </p:set>
-                                  </p:childTnLst>
-                                </p:cTn>
-                              </p:par>
-                              <p:par>
-                                <p:cTn id="19" presetID="10" presetClass="exit" presetSubtype="0" fill="hold" grpId="1" nodeType="withEffect">
-                                  <p:stCondLst>
-                                    <p:cond delay="0"/>
-                                  </p:stCondLst>
-                                  <p:childTnLst>
-                                    <p:animEffect transition="out" filter="fade">
-                                      <p:cBhvr>
-                                        <p:cTn id="20" dur="2000"/>
-                                        <p:tgtEl>
-                                          <p:spTgt spid="21"/>
-                                        </p:tgtEl>
-                                      </p:cBhvr>
-                                    </p:animEffect>
-                                    <p:set>
-                                      <p:cBhvr>
-                                        <p:cTn id="21" dur="1" fill="hold">
-                                          <p:stCondLst>
-                                            <p:cond delay="1999"/>
-                                          </p:stCondLst>
-                                        </p:cTn>
-                                        <p:tgtEl>
-                                          <p:spTgt spid="21"/>
-                                        </p:tgtEl>
-                                        <p:attrNameLst>
-                                          <p:attrName>style.visibility</p:attrName>
-                                        </p:attrNameLst>
-                                      </p:cBhvr>
-                                      <p:to>
-                                        <p:strVal val="hidden"/>
-                                      </p:to>
-                                    </p:set>
-                                  </p:childTnLst>
-                                </p:cTn>
-                              </p:par>
-                            </p:childTnLst>
-                          </p:cTn>
-                        </p:par>
-                      </p:childTnLst>
-                    </p:cTn>
-                  </p:par>
-                </p:childTnLst>
-              </p:cTn>
-              <p:prevCondLst>
-                <p:cond evt="onPrev" delay="0">
-                  <p:tgtEl>
-                    <p:sldTgt/>
-                  </p:tgtEl>
-                </p:cond>
-              </p:prevCondLst>
-              <p:nextCondLst>
-                <p:cond evt="onNext" delay="0">
-                  <p:tgtEl>
-                    <p:sldTgt/>
-                  </p:tgtEl>
-                </p:cond>
-              </p:nextCondLst>
-            </p:seq>
-          </p:childTnLst>
-        </p:cTn>
+        <p:cTn id="1" dur="indefinite" restart="never" nodeType="tmRoot"/>
       </p:par>
     </p:tnLst>
-    <p:bldLst>
-      <p:bldP spid="20" grpId="0" animBg="1"/>
-      <p:bldP spid="20" grpId="1" animBg="1"/>
-      <p:bldP spid="21" grpId="0" animBg="1"/>
-      <p:bldP spid="21" grpId="1" animBg="1"/>
-      <p:bldP spid="22" grpId="0" animBg="1"/>
-    </p:bldLst>
   </p:timing>
 </p:sld>
 </file>
@@ -8422,26 +7898,20 @@
           <a:lstStyle/>
           <a:p>
             <a:r>
-              <a:rPr lang="en-US" smtClean="0"/>
+              <a:rPr lang="en-US" dirty="0" smtClean="0"/>
               <a:t>MCSDK Overview</a:t>
             </a:r>
           </a:p>
           <a:p>
             <a:r>
-              <a:rPr lang="en-US" smtClean="0"/>
+              <a:rPr lang="en-US" dirty="0" smtClean="0"/>
               <a:t>Software Architecture</a:t>
             </a:r>
           </a:p>
           <a:p>
             <a:r>
-              <a:rPr lang="en-US" smtClean="0"/>
+              <a:rPr lang="en-US" dirty="0" smtClean="0"/>
               <a:t>Evaluation Module (EVM)</a:t>
-            </a:r>
-          </a:p>
-          <a:p>
-            <a:r>
-              <a:rPr lang="en-US" smtClean="0"/>
-              <a:t>MCSDK Benefits</a:t>
             </a:r>
           </a:p>
         </p:txBody>
@@ -9863,315 +9333,6 @@
       </p:grpSpPr>
       <p:sp>
         <p:nvSpPr>
-          <p:cNvPr id="4" name="TextBox 3"/>
-          <p:cNvSpPr txBox="1"/>
-          <p:nvPr/>
-        </p:nvSpPr>
-        <p:spPr>
-          <a:xfrm>
-            <a:off x="457200" y="2797175"/>
-            <a:ext cx="8229600" cy="503238"/>
-          </a:xfrm>
-          <a:prstGeom prst="rect">
-            <a:avLst/>
-          </a:prstGeom>
-          <a:solidFill>
-            <a:srgbClr val="FFFF00"/>
-          </a:solidFill>
-          <a:ln>
-            <a:solidFill>
-              <a:schemeClr val="bg1">
-                <a:lumMod val="50000"/>
-              </a:schemeClr>
-            </a:solidFill>
-          </a:ln>
-        </p:spPr>
-        <p:txBody>
-          <a:bodyPr/>
-          <a:lstStyle/>
-          <a:p>
-            <a:pPr fontAlgn="auto">
-              <a:spcBef>
-                <a:spcPts val="0"/>
-              </a:spcBef>
-              <a:spcAft>
-                <a:spcPts val="0"/>
-              </a:spcAft>
-              <a:defRPr/>
-            </a:pPr>
-            <a:endParaRPr lang="en-US" dirty="0">
-              <a:latin typeface="+mn-lt"/>
-            </a:endParaRPr>
-          </a:p>
-        </p:txBody>
-      </p:sp>
-      <p:sp>
-        <p:nvSpPr>
-          <p:cNvPr id="30722" name="Title 3"/>
-          <p:cNvSpPr>
-            <a:spLocks noGrp="1"/>
-          </p:cNvSpPr>
-          <p:nvPr>
-            <p:ph type="title"/>
-          </p:nvPr>
-        </p:nvSpPr>
-        <p:spPr/>
-        <p:txBody>
-          <a:bodyPr/>
-          <a:lstStyle/>
-          <a:p>
-            <a:r>
-              <a:rPr lang="en-US" smtClean="0"/>
-              <a:t>MCSDK Benefits</a:t>
-            </a:r>
-          </a:p>
-        </p:txBody>
-      </p:sp>
-      <p:sp>
-        <p:nvSpPr>
-          <p:cNvPr id="30723" name="Content Placeholder 4"/>
-          <p:cNvSpPr>
-            <a:spLocks noGrp="1"/>
-          </p:cNvSpPr>
-          <p:nvPr>
-            <p:ph idx="1"/>
-          </p:nvPr>
-        </p:nvSpPr>
-        <p:spPr>
-          <a:xfrm>
-            <a:off x="457200" y="990600"/>
-            <a:ext cx="8153400" cy="5334000"/>
-          </a:xfrm>
-        </p:spPr>
-        <p:txBody>
-          <a:bodyPr/>
-          <a:lstStyle/>
-          <a:p>
-            <a:r>
-              <a:rPr lang="en-US" smtClean="0"/>
-              <a:t>MCSDK Overview</a:t>
-            </a:r>
-          </a:p>
-          <a:p>
-            <a:r>
-              <a:rPr lang="en-US" smtClean="0"/>
-              <a:t>Software Architecture</a:t>
-            </a:r>
-          </a:p>
-          <a:p>
-            <a:r>
-              <a:rPr lang="en-US" smtClean="0"/>
-              <a:t>Evaluation Module (EVM)</a:t>
-            </a:r>
-          </a:p>
-          <a:p>
-            <a:r>
-              <a:rPr lang="en-US" smtClean="0"/>
-              <a:t>MCSDK Benefits</a:t>
-            </a:r>
-          </a:p>
-        </p:txBody>
-      </p:sp>
-    </p:spTree>
-    <p:custDataLst>
-      <p:tags r:id="rId1"/>
-    </p:custDataLst>
-  </p:cSld>
-  <p:clrMapOvr>
-    <a:masterClrMapping/>
-  </p:clrMapOvr>
-  <p:timing>
-    <p:tnLst>
-      <p:par>
-        <p:cTn id="1" dur="indefinite" restart="never" nodeType="tmRoot"/>
-      </p:par>
-    </p:tnLst>
-  </p:timing>
-</p:sld>
-</file>
-
-<file path=ppt/slides/slide15.xml><?xml version="1.0" encoding="utf-8"?>
-<p:sld xmlns:a="http://schemas.openxmlformats.org/drawingml/2006/main" xmlns:r="http://schemas.openxmlformats.org/officeDocument/2006/relationships" xmlns:p="http://schemas.openxmlformats.org/presentationml/2006/main">
-  <p:cSld>
-    <p:spTree>
-      <p:nvGrpSpPr>
-        <p:cNvPr id="1" name=""/>
-        <p:cNvGrpSpPr/>
-        <p:nvPr/>
-      </p:nvGrpSpPr>
-      <p:grpSpPr>
-        <a:xfrm>
-          <a:off x="0" y="0"/>
-          <a:ext cx="0" cy="0"/>
-          <a:chOff x="0" y="0"/>
-          <a:chExt cx="0" cy="0"/>
-        </a:xfrm>
-      </p:grpSpPr>
-      <p:sp>
-        <p:nvSpPr>
-          <p:cNvPr id="31745" name="Title 4"/>
-          <p:cNvSpPr>
-            <a:spLocks noGrp="1"/>
-          </p:cNvSpPr>
-          <p:nvPr>
-            <p:ph type="title"/>
-          </p:nvPr>
-        </p:nvSpPr>
-        <p:spPr/>
-        <p:txBody>
-          <a:bodyPr/>
-          <a:lstStyle/>
-          <a:p>
-            <a:r>
-              <a:rPr lang="en-US" smtClean="0"/>
-              <a:t>MCSDK Benefits</a:t>
-            </a:r>
-          </a:p>
-        </p:txBody>
-      </p:sp>
-      <p:sp>
-        <p:nvSpPr>
-          <p:cNvPr id="31746" name="Content Placeholder 5"/>
-          <p:cNvSpPr>
-            <a:spLocks noGrp="1"/>
-          </p:cNvSpPr>
-          <p:nvPr>
-            <p:ph sz="half" idx="1"/>
-          </p:nvPr>
-        </p:nvSpPr>
-        <p:spPr/>
-        <p:txBody>
-          <a:bodyPr/>
-          <a:lstStyle/>
-          <a:p>
-            <a:r>
-              <a:rPr lang="en-US" sz="2000" dirty="0" smtClean="0"/>
-              <a:t>Faster time to market for end-customer products </a:t>
-            </a:r>
-          </a:p>
-          <a:p>
-            <a:r>
-              <a:rPr lang="en-US" sz="2000" dirty="0" smtClean="0"/>
-              <a:t>Stable foundation of optimized software components </a:t>
-            </a:r>
-          </a:p>
-          <a:p>
-            <a:r>
-              <a:rPr lang="en-US" sz="2000" dirty="0" smtClean="0"/>
-              <a:t>Multicore programming methodologies</a:t>
-            </a:r>
-          </a:p>
-          <a:p>
-            <a:r>
-              <a:rPr lang="en-US" sz="2000" dirty="0" smtClean="0"/>
-              <a:t>Free, full source code</a:t>
-            </a:r>
-          </a:p>
-          <a:p>
-            <a:r>
-              <a:rPr lang="en-US" sz="2000" dirty="0" smtClean="0"/>
-              <a:t>Easy-to-use, hardened API</a:t>
-            </a:r>
-          </a:p>
-          <a:p>
-            <a:r>
-              <a:rPr lang="en-US" sz="2000" dirty="0" smtClean="0"/>
-              <a:t>Modular software architecture to simplify migration to future SOC</a:t>
-            </a:r>
-          </a:p>
-        </p:txBody>
-      </p:sp>
-      <p:sp>
-        <p:nvSpPr>
-          <p:cNvPr id="31747" name="Content Placeholder 6"/>
-          <p:cNvSpPr>
-            <a:spLocks noGrp="1"/>
-          </p:cNvSpPr>
-          <p:nvPr>
-            <p:ph sz="half" idx="2"/>
-          </p:nvPr>
-        </p:nvSpPr>
-        <p:spPr/>
-        <p:txBody>
-          <a:bodyPr/>
-          <a:lstStyle/>
-          <a:p>
-            <a:r>
-              <a:rPr lang="en-US" sz="2000" dirty="0" smtClean="0"/>
-              <a:t>Built-in demonstrations showcasing SOC strengths and </a:t>
-            </a:r>
-            <a:r>
-              <a:rPr lang="en-US" sz="2000" dirty="0" err="1" smtClean="0"/>
-              <a:t>multicore</a:t>
-            </a:r>
-            <a:r>
-              <a:rPr lang="en-US" sz="2000" dirty="0" smtClean="0"/>
-              <a:t> software framework</a:t>
-            </a:r>
-          </a:p>
-          <a:p>
-            <a:r>
-              <a:rPr lang="en-US" sz="2000" dirty="0" smtClean="0"/>
-              <a:t>Positive customer out-of-box experience</a:t>
-            </a:r>
-          </a:p>
-          <a:p>
-            <a:r>
-              <a:rPr lang="en-US" sz="2000" dirty="0" smtClean="0"/>
-              <a:t>Software ecosystem with third-party tools</a:t>
-            </a:r>
-          </a:p>
-          <a:p>
-            <a:r>
-              <a:rPr lang="en-US" sz="2000" dirty="0" smtClean="0"/>
-              <a:t>Documentation: Online wiki</a:t>
-            </a:r>
-          </a:p>
-          <a:p>
-            <a:r>
-              <a:rPr lang="en-US" sz="2000" dirty="0" smtClean="0"/>
-              <a:t>Support: E2E forum</a:t>
-            </a:r>
-          </a:p>
-        </p:txBody>
-      </p:sp>
-    </p:spTree>
-    <p:custDataLst>
-      <p:tags r:id="rId1"/>
-    </p:custDataLst>
-  </p:cSld>
-  <p:clrMapOvr>
-    <a:masterClrMapping/>
-  </p:clrMapOvr>
-  <p:timing>
-    <p:tnLst>
-      <p:par>
-        <p:cTn id="1" dur="indefinite" restart="never" nodeType="tmRoot"/>
-      </p:par>
-    </p:tnLst>
-  </p:timing>
-</p:sld>
-</file>
-
-<file path=ppt/slides/slide16.xml><?xml version="1.0" encoding="utf-8"?>
-<p:sld xmlns:a="http://schemas.openxmlformats.org/drawingml/2006/main" xmlns:r="http://schemas.openxmlformats.org/officeDocument/2006/relationships" xmlns:p="http://schemas.openxmlformats.org/presentationml/2006/main">
-  <p:cSld>
-    <p:spTree>
-      <p:nvGrpSpPr>
-        <p:cNvPr id="1" name=""/>
-        <p:cNvGrpSpPr/>
-        <p:nvPr/>
-      </p:nvGrpSpPr>
-      <p:grpSpPr>
-        <a:xfrm>
-          <a:off x="0" y="0"/>
-          <a:ext cx="0" cy="0"/>
-          <a:chOff x="0" y="0"/>
-          <a:chExt cx="0" cy="0"/>
-        </a:xfrm>
-      </p:grpSpPr>
-      <p:sp>
-        <p:nvSpPr>
           <p:cNvPr id="32769" name="Title 1"/>
           <p:cNvSpPr>
             <a:spLocks noGrp="1"/>
@@ -10856,784 +10017,9 @@
   <p:timing>
     <p:tnLst>
       <p:par>
-        <p:cTn id="1" dur="indefinite" restart="never" nodeType="tmRoot">
-          <p:childTnLst>
-            <p:seq concurrent="1" nextAc="seek">
-              <p:cTn id="2" dur="indefinite" nodeType="mainSeq">
-                <p:childTnLst>
-                  <p:par>
-                    <p:cTn id="3" fill="hold">
-                      <p:stCondLst>
-                        <p:cond delay="indefinite"/>
-                      </p:stCondLst>
-                      <p:childTnLst>
-                        <p:par>
-                          <p:cTn id="4" fill="hold">
-                            <p:stCondLst>
-                              <p:cond delay="0"/>
-                            </p:stCondLst>
-                            <p:childTnLst>
-                              <p:par>
-                                <p:cTn id="5" presetID="10" presetClass="entr" presetSubtype="0" fill="hold" grpId="0" nodeType="clickEffect">
-                                  <p:stCondLst>
-                                    <p:cond delay="0"/>
-                                  </p:stCondLst>
-                                  <p:childTnLst>
-                                    <p:set>
-                                      <p:cBhvr>
-                                        <p:cTn id="6" dur="1" fill="hold">
-                                          <p:stCondLst>
-                                            <p:cond delay="0"/>
-                                          </p:stCondLst>
-                                        </p:cTn>
-                                        <p:tgtEl>
-                                          <p:spTgt spid="14"/>
-                                        </p:tgtEl>
-                                        <p:attrNameLst>
-                                          <p:attrName>style.visibility</p:attrName>
-                                        </p:attrNameLst>
-                                      </p:cBhvr>
-                                      <p:to>
-                                        <p:strVal val="visible"/>
-                                      </p:to>
-                                    </p:set>
-                                    <p:animEffect transition="in" filter="fade">
-                                      <p:cBhvr>
-                                        <p:cTn id="7" dur="1000"/>
-                                        <p:tgtEl>
-                                          <p:spTgt spid="14"/>
-                                        </p:tgtEl>
-                                      </p:cBhvr>
-                                    </p:animEffect>
-                                  </p:childTnLst>
-                                </p:cTn>
-                              </p:par>
-                              <p:par>
-                                <p:cTn id="8" presetID="2" presetClass="entr" presetSubtype="8" fill="hold" grpId="0" nodeType="withEffect">
-                                  <p:stCondLst>
-                                    <p:cond delay="0"/>
-                                  </p:stCondLst>
-                                  <p:childTnLst>
-                                    <p:set>
-                                      <p:cBhvr>
-                                        <p:cTn id="9" dur="1" fill="hold">
-                                          <p:stCondLst>
-                                            <p:cond delay="0"/>
-                                          </p:stCondLst>
-                                        </p:cTn>
-                                        <p:tgtEl>
-                                          <p:spTgt spid="10"/>
-                                        </p:tgtEl>
-                                        <p:attrNameLst>
-                                          <p:attrName>style.visibility</p:attrName>
-                                        </p:attrNameLst>
-                                      </p:cBhvr>
-                                      <p:to>
-                                        <p:strVal val="visible"/>
-                                      </p:to>
-                                    </p:set>
-                                    <p:anim calcmode="lin" valueType="num">
-                                      <p:cBhvr additive="base">
-                                        <p:cTn id="10" dur="500" fill="hold"/>
-                                        <p:tgtEl>
-                                          <p:spTgt spid="10"/>
-                                        </p:tgtEl>
-                                        <p:attrNameLst>
-                                          <p:attrName>ppt_x</p:attrName>
-                                        </p:attrNameLst>
-                                      </p:cBhvr>
-                                      <p:tavLst>
-                                        <p:tav tm="0">
-                                          <p:val>
-                                            <p:strVal val="0-#ppt_w/2"/>
-                                          </p:val>
-                                        </p:tav>
-                                        <p:tav tm="100000">
-                                          <p:val>
-                                            <p:strVal val="#ppt_x"/>
-                                          </p:val>
-                                        </p:tav>
-                                      </p:tavLst>
-                                    </p:anim>
-                                    <p:anim calcmode="lin" valueType="num">
-                                      <p:cBhvr additive="base">
-                                        <p:cTn id="11" dur="500" fill="hold"/>
-                                        <p:tgtEl>
-                                          <p:spTgt spid="10"/>
-                                        </p:tgtEl>
-                                        <p:attrNameLst>
-                                          <p:attrName>ppt_y</p:attrName>
-                                        </p:attrNameLst>
-                                      </p:cBhvr>
-                                      <p:tavLst>
-                                        <p:tav tm="0">
-                                          <p:val>
-                                            <p:strVal val="#ppt_y"/>
-                                          </p:val>
-                                        </p:tav>
-                                        <p:tav tm="100000">
-                                          <p:val>
-                                            <p:strVal val="#ppt_y"/>
-                                          </p:val>
-                                        </p:tav>
-                                      </p:tavLst>
-                                    </p:anim>
-                                  </p:childTnLst>
-                                </p:cTn>
-                              </p:par>
-                              <p:par>
-                                <p:cTn id="12" presetID="2" presetClass="entr" presetSubtype="8" fill="hold" nodeType="withEffect">
-                                  <p:stCondLst>
-                                    <p:cond delay="0"/>
-                                  </p:stCondLst>
-                                  <p:childTnLst>
-                                    <p:set>
-                                      <p:cBhvr>
-                                        <p:cTn id="13" dur="1" fill="hold">
-                                          <p:stCondLst>
-                                            <p:cond delay="0"/>
-                                          </p:stCondLst>
-                                        </p:cTn>
-                                        <p:tgtEl>
-                                          <p:spTgt spid="88066"/>
-                                        </p:tgtEl>
-                                        <p:attrNameLst>
-                                          <p:attrName>style.visibility</p:attrName>
-                                        </p:attrNameLst>
-                                      </p:cBhvr>
-                                      <p:to>
-                                        <p:strVal val="visible"/>
-                                      </p:to>
-                                    </p:set>
-                                    <p:anim calcmode="lin" valueType="num">
-                                      <p:cBhvr additive="base">
-                                        <p:cTn id="14" dur="500" fill="hold"/>
-                                        <p:tgtEl>
-                                          <p:spTgt spid="88066"/>
-                                        </p:tgtEl>
-                                        <p:attrNameLst>
-                                          <p:attrName>ppt_x</p:attrName>
-                                        </p:attrNameLst>
-                                      </p:cBhvr>
-                                      <p:tavLst>
-                                        <p:tav tm="0">
-                                          <p:val>
-                                            <p:strVal val="0-#ppt_w/2"/>
-                                          </p:val>
-                                        </p:tav>
-                                        <p:tav tm="100000">
-                                          <p:val>
-                                            <p:strVal val="#ppt_x"/>
-                                          </p:val>
-                                        </p:tav>
-                                      </p:tavLst>
-                                    </p:anim>
-                                    <p:anim calcmode="lin" valueType="num">
-                                      <p:cBhvr additive="base">
-                                        <p:cTn id="15" dur="500" fill="hold"/>
-                                        <p:tgtEl>
-                                          <p:spTgt spid="88066"/>
-                                        </p:tgtEl>
-                                        <p:attrNameLst>
-                                          <p:attrName>ppt_y</p:attrName>
-                                        </p:attrNameLst>
-                                      </p:cBhvr>
-                                      <p:tavLst>
-                                        <p:tav tm="0">
-                                          <p:val>
-                                            <p:strVal val="#ppt_y"/>
-                                          </p:val>
-                                        </p:tav>
-                                        <p:tav tm="100000">
-                                          <p:val>
-                                            <p:strVal val="#ppt_y"/>
-                                          </p:val>
-                                        </p:tav>
-                                      </p:tavLst>
-                                    </p:anim>
-                                  </p:childTnLst>
-                                </p:cTn>
-                              </p:par>
-                            </p:childTnLst>
-                          </p:cTn>
-                        </p:par>
-                      </p:childTnLst>
-                    </p:cTn>
-                  </p:par>
-                  <p:par>
-                    <p:cTn id="16" fill="hold">
-                      <p:stCondLst>
-                        <p:cond delay="indefinite"/>
-                      </p:stCondLst>
-                      <p:childTnLst>
-                        <p:par>
-                          <p:cTn id="17" fill="hold">
-                            <p:stCondLst>
-                              <p:cond delay="0"/>
-                            </p:stCondLst>
-                            <p:childTnLst>
-                              <p:par>
-                                <p:cTn id="18" presetID="10" presetClass="entr" presetSubtype="0" fill="hold" grpId="0" nodeType="clickEffect">
-                                  <p:stCondLst>
-                                    <p:cond delay="0"/>
-                                  </p:stCondLst>
-                                  <p:childTnLst>
-                                    <p:set>
-                                      <p:cBhvr>
-                                        <p:cTn id="19" dur="1" fill="hold">
-                                          <p:stCondLst>
-                                            <p:cond delay="0"/>
-                                          </p:stCondLst>
-                                        </p:cTn>
-                                        <p:tgtEl>
-                                          <p:spTgt spid="13"/>
-                                        </p:tgtEl>
-                                        <p:attrNameLst>
-                                          <p:attrName>style.visibility</p:attrName>
-                                        </p:attrNameLst>
-                                      </p:cBhvr>
-                                      <p:to>
-                                        <p:strVal val="visible"/>
-                                      </p:to>
-                                    </p:set>
-                                    <p:animEffect transition="in" filter="fade">
-                                      <p:cBhvr>
-                                        <p:cTn id="20" dur="1000"/>
-                                        <p:tgtEl>
-                                          <p:spTgt spid="13"/>
-                                        </p:tgtEl>
-                                      </p:cBhvr>
-                                    </p:animEffect>
-                                  </p:childTnLst>
-                                </p:cTn>
-                              </p:par>
-                              <p:par>
-                                <p:cTn id="21" presetID="2" presetClass="entr" presetSubtype="2" fill="hold" grpId="0" nodeType="withEffect">
-                                  <p:stCondLst>
-                                    <p:cond delay="0"/>
-                                  </p:stCondLst>
-                                  <p:childTnLst>
-                                    <p:set>
-                                      <p:cBhvr>
-                                        <p:cTn id="22" dur="1" fill="hold">
-                                          <p:stCondLst>
-                                            <p:cond delay="0"/>
-                                          </p:stCondLst>
-                                        </p:cTn>
-                                        <p:tgtEl>
-                                          <p:spTgt spid="11"/>
-                                        </p:tgtEl>
-                                        <p:attrNameLst>
-                                          <p:attrName>style.visibility</p:attrName>
-                                        </p:attrNameLst>
-                                      </p:cBhvr>
-                                      <p:to>
-                                        <p:strVal val="visible"/>
-                                      </p:to>
-                                    </p:set>
-                                    <p:anim calcmode="lin" valueType="num">
-                                      <p:cBhvr additive="base">
-                                        <p:cTn id="23" dur="500" fill="hold"/>
-                                        <p:tgtEl>
-                                          <p:spTgt spid="11"/>
-                                        </p:tgtEl>
-                                        <p:attrNameLst>
-                                          <p:attrName>ppt_x</p:attrName>
-                                        </p:attrNameLst>
-                                      </p:cBhvr>
-                                      <p:tavLst>
-                                        <p:tav tm="0">
-                                          <p:val>
-                                            <p:strVal val="1+#ppt_w/2"/>
-                                          </p:val>
-                                        </p:tav>
-                                        <p:tav tm="100000">
-                                          <p:val>
-                                            <p:strVal val="#ppt_x"/>
-                                          </p:val>
-                                        </p:tav>
-                                      </p:tavLst>
-                                    </p:anim>
-                                    <p:anim calcmode="lin" valueType="num">
-                                      <p:cBhvr additive="base">
-                                        <p:cTn id="24" dur="500" fill="hold"/>
-                                        <p:tgtEl>
-                                          <p:spTgt spid="11"/>
-                                        </p:tgtEl>
-                                        <p:attrNameLst>
-                                          <p:attrName>ppt_y</p:attrName>
-                                        </p:attrNameLst>
-                                      </p:cBhvr>
-                                      <p:tavLst>
-                                        <p:tav tm="0">
-                                          <p:val>
-                                            <p:strVal val="#ppt_y"/>
-                                          </p:val>
-                                        </p:tav>
-                                        <p:tav tm="100000">
-                                          <p:val>
-                                            <p:strVal val="#ppt_y"/>
-                                          </p:val>
-                                        </p:tav>
-                                      </p:tavLst>
-                                    </p:anim>
-                                  </p:childTnLst>
-                                </p:cTn>
-                              </p:par>
-                              <p:par>
-                                <p:cTn id="25" presetID="2" presetClass="entr" presetSubtype="2" fill="hold" nodeType="withEffect">
-                                  <p:stCondLst>
-                                    <p:cond delay="0"/>
-                                  </p:stCondLst>
-                                  <p:childTnLst>
-                                    <p:set>
-                                      <p:cBhvr>
-                                        <p:cTn id="26" dur="1" fill="hold">
-                                          <p:stCondLst>
-                                            <p:cond delay="0"/>
-                                          </p:stCondLst>
-                                        </p:cTn>
-                                        <p:tgtEl>
-                                          <p:spTgt spid="88067"/>
-                                        </p:tgtEl>
-                                        <p:attrNameLst>
-                                          <p:attrName>style.visibility</p:attrName>
-                                        </p:attrNameLst>
-                                      </p:cBhvr>
-                                      <p:to>
-                                        <p:strVal val="visible"/>
-                                      </p:to>
-                                    </p:set>
-                                    <p:anim calcmode="lin" valueType="num">
-                                      <p:cBhvr additive="base">
-                                        <p:cTn id="27" dur="500" fill="hold"/>
-                                        <p:tgtEl>
-                                          <p:spTgt spid="88067"/>
-                                        </p:tgtEl>
-                                        <p:attrNameLst>
-                                          <p:attrName>ppt_x</p:attrName>
-                                        </p:attrNameLst>
-                                      </p:cBhvr>
-                                      <p:tavLst>
-                                        <p:tav tm="0">
-                                          <p:val>
-                                            <p:strVal val="1+#ppt_w/2"/>
-                                          </p:val>
-                                        </p:tav>
-                                        <p:tav tm="100000">
-                                          <p:val>
-                                            <p:strVal val="#ppt_x"/>
-                                          </p:val>
-                                        </p:tav>
-                                      </p:tavLst>
-                                    </p:anim>
-                                    <p:anim calcmode="lin" valueType="num">
-                                      <p:cBhvr additive="base">
-                                        <p:cTn id="28" dur="500" fill="hold"/>
-                                        <p:tgtEl>
-                                          <p:spTgt spid="88067"/>
-                                        </p:tgtEl>
-                                        <p:attrNameLst>
-                                          <p:attrName>ppt_y</p:attrName>
-                                        </p:attrNameLst>
-                                      </p:cBhvr>
-                                      <p:tavLst>
-                                        <p:tav tm="0">
-                                          <p:val>
-                                            <p:strVal val="#ppt_y"/>
-                                          </p:val>
-                                        </p:tav>
-                                        <p:tav tm="100000">
-                                          <p:val>
-                                            <p:strVal val="#ppt_y"/>
-                                          </p:val>
-                                        </p:tav>
-                                      </p:tavLst>
-                                    </p:anim>
-                                  </p:childTnLst>
-                                </p:cTn>
-                              </p:par>
-                            </p:childTnLst>
-                          </p:cTn>
-                        </p:par>
-                      </p:childTnLst>
-                    </p:cTn>
-                  </p:par>
-                  <p:par>
-                    <p:cTn id="29" fill="hold">
-                      <p:stCondLst>
-                        <p:cond delay="indefinite"/>
-                      </p:stCondLst>
-                      <p:childTnLst>
-                        <p:par>
-                          <p:cTn id="30" fill="hold">
-                            <p:stCondLst>
-                              <p:cond delay="0"/>
-                            </p:stCondLst>
-                            <p:childTnLst>
-                              <p:par>
-                                <p:cTn id="31" presetID="10" presetClass="entr" presetSubtype="0" fill="hold" grpId="0" nodeType="clickEffect">
-                                  <p:stCondLst>
-                                    <p:cond delay="0"/>
-                                  </p:stCondLst>
-                                  <p:childTnLst>
-                                    <p:set>
-                                      <p:cBhvr>
-                                        <p:cTn id="32" dur="1" fill="hold">
-                                          <p:stCondLst>
-                                            <p:cond delay="0"/>
-                                          </p:stCondLst>
-                                        </p:cTn>
-                                        <p:tgtEl>
-                                          <p:spTgt spid="15"/>
-                                        </p:tgtEl>
-                                        <p:attrNameLst>
-                                          <p:attrName>style.visibility</p:attrName>
-                                        </p:attrNameLst>
-                                      </p:cBhvr>
-                                      <p:to>
-                                        <p:strVal val="visible"/>
-                                      </p:to>
-                                    </p:set>
-                                    <p:animEffect transition="in" filter="fade">
-                                      <p:cBhvr>
-                                        <p:cTn id="33" dur="1000"/>
-                                        <p:tgtEl>
-                                          <p:spTgt spid="15"/>
-                                        </p:tgtEl>
-                                      </p:cBhvr>
-                                    </p:animEffect>
-                                  </p:childTnLst>
-                                </p:cTn>
-                              </p:par>
-                              <p:par>
-                                <p:cTn id="34" presetID="2" presetClass="entr" presetSubtype="4" fill="hold" grpId="0" nodeType="withEffect">
-                                  <p:stCondLst>
-                                    <p:cond delay="0"/>
-                                  </p:stCondLst>
-                                  <p:childTnLst>
-                                    <p:set>
-                                      <p:cBhvr>
-                                        <p:cTn id="35" dur="1" fill="hold">
-                                          <p:stCondLst>
-                                            <p:cond delay="0"/>
-                                          </p:stCondLst>
-                                        </p:cTn>
-                                        <p:tgtEl>
-                                          <p:spTgt spid="9"/>
-                                        </p:tgtEl>
-                                        <p:attrNameLst>
-                                          <p:attrName>style.visibility</p:attrName>
-                                        </p:attrNameLst>
-                                      </p:cBhvr>
-                                      <p:to>
-                                        <p:strVal val="visible"/>
-                                      </p:to>
-                                    </p:set>
-                                    <p:anim calcmode="lin" valueType="num">
-                                      <p:cBhvr additive="base">
-                                        <p:cTn id="36" dur="500" fill="hold"/>
-                                        <p:tgtEl>
-                                          <p:spTgt spid="9"/>
-                                        </p:tgtEl>
-                                        <p:attrNameLst>
-                                          <p:attrName>ppt_x</p:attrName>
-                                        </p:attrNameLst>
-                                      </p:cBhvr>
-                                      <p:tavLst>
-                                        <p:tav tm="0">
-                                          <p:val>
-                                            <p:strVal val="#ppt_x"/>
-                                          </p:val>
-                                        </p:tav>
-                                        <p:tav tm="100000">
-                                          <p:val>
-                                            <p:strVal val="#ppt_x"/>
-                                          </p:val>
-                                        </p:tav>
-                                      </p:tavLst>
-                                    </p:anim>
-                                    <p:anim calcmode="lin" valueType="num">
-                                      <p:cBhvr additive="base">
-                                        <p:cTn id="37" dur="500" fill="hold"/>
-                                        <p:tgtEl>
-                                          <p:spTgt spid="9"/>
-                                        </p:tgtEl>
-                                        <p:attrNameLst>
-                                          <p:attrName>ppt_y</p:attrName>
-                                        </p:attrNameLst>
-                                      </p:cBhvr>
-                                      <p:tavLst>
-                                        <p:tav tm="0">
-                                          <p:val>
-                                            <p:strVal val="1+#ppt_h/2"/>
-                                          </p:val>
-                                        </p:tav>
-                                        <p:tav tm="100000">
-                                          <p:val>
-                                            <p:strVal val="#ppt_y"/>
-                                          </p:val>
-                                        </p:tav>
-                                      </p:tavLst>
-                                    </p:anim>
-                                  </p:childTnLst>
-                                </p:cTn>
-                              </p:par>
-                              <p:par>
-                                <p:cTn id="38" presetID="2" presetClass="entr" presetSubtype="4" fill="hold" grpId="0" nodeType="withEffect">
-                                  <p:stCondLst>
-                                    <p:cond delay="0"/>
-                                  </p:stCondLst>
-                                  <p:childTnLst>
-                                    <p:set>
-                                      <p:cBhvr>
-                                        <p:cTn id="39" dur="1" fill="hold">
-                                          <p:stCondLst>
-                                            <p:cond delay="0"/>
-                                          </p:stCondLst>
-                                        </p:cTn>
-                                        <p:tgtEl>
-                                          <p:spTgt spid="12"/>
-                                        </p:tgtEl>
-                                        <p:attrNameLst>
-                                          <p:attrName>style.visibility</p:attrName>
-                                        </p:attrNameLst>
-                                      </p:cBhvr>
-                                      <p:to>
-                                        <p:strVal val="visible"/>
-                                      </p:to>
-                                    </p:set>
-                                    <p:anim calcmode="lin" valueType="num">
-                                      <p:cBhvr additive="base">
-                                        <p:cTn id="40" dur="500" fill="hold"/>
-                                        <p:tgtEl>
-                                          <p:spTgt spid="12"/>
-                                        </p:tgtEl>
-                                        <p:attrNameLst>
-                                          <p:attrName>ppt_x</p:attrName>
-                                        </p:attrNameLst>
-                                      </p:cBhvr>
-                                      <p:tavLst>
-                                        <p:tav tm="0">
-                                          <p:val>
-                                            <p:strVal val="#ppt_x"/>
-                                          </p:val>
-                                        </p:tav>
-                                        <p:tav tm="100000">
-                                          <p:val>
-                                            <p:strVal val="#ppt_x"/>
-                                          </p:val>
-                                        </p:tav>
-                                      </p:tavLst>
-                                    </p:anim>
-                                    <p:anim calcmode="lin" valueType="num">
-                                      <p:cBhvr additive="base">
-                                        <p:cTn id="41" dur="500" fill="hold"/>
-                                        <p:tgtEl>
-                                          <p:spTgt spid="12"/>
-                                        </p:tgtEl>
-                                        <p:attrNameLst>
-                                          <p:attrName>ppt_y</p:attrName>
-                                        </p:attrNameLst>
-                                      </p:cBhvr>
-                                      <p:tavLst>
-                                        <p:tav tm="0">
-                                          <p:val>
-                                            <p:strVal val="1+#ppt_h/2"/>
-                                          </p:val>
-                                        </p:tav>
-                                        <p:tav tm="100000">
-                                          <p:val>
-                                            <p:strVal val="#ppt_y"/>
-                                          </p:val>
-                                        </p:tav>
-                                      </p:tavLst>
-                                    </p:anim>
-                                  </p:childTnLst>
-                                </p:cTn>
-                              </p:par>
-                              <p:par>
-                                <p:cTn id="42" presetID="2" presetClass="entr" presetSubtype="4" fill="hold" nodeType="withEffect">
-                                  <p:stCondLst>
-                                    <p:cond delay="0"/>
-                                  </p:stCondLst>
-                                  <p:childTnLst>
-                                    <p:set>
-                                      <p:cBhvr>
-                                        <p:cTn id="43" dur="1" fill="hold">
-                                          <p:stCondLst>
-                                            <p:cond delay="0"/>
-                                          </p:stCondLst>
-                                        </p:cTn>
-                                        <p:tgtEl>
-                                          <p:spTgt spid="88068"/>
-                                        </p:tgtEl>
-                                        <p:attrNameLst>
-                                          <p:attrName>style.visibility</p:attrName>
-                                        </p:attrNameLst>
-                                      </p:cBhvr>
-                                      <p:to>
-                                        <p:strVal val="visible"/>
-                                      </p:to>
-                                    </p:set>
-                                    <p:anim calcmode="lin" valueType="num">
-                                      <p:cBhvr additive="base">
-                                        <p:cTn id="44" dur="500" fill="hold"/>
-                                        <p:tgtEl>
-                                          <p:spTgt spid="88068"/>
-                                        </p:tgtEl>
-                                        <p:attrNameLst>
-                                          <p:attrName>ppt_x</p:attrName>
-                                        </p:attrNameLst>
-                                      </p:cBhvr>
-                                      <p:tavLst>
-                                        <p:tav tm="0">
-                                          <p:val>
-                                            <p:strVal val="#ppt_x"/>
-                                          </p:val>
-                                        </p:tav>
-                                        <p:tav tm="100000">
-                                          <p:val>
-                                            <p:strVal val="#ppt_x"/>
-                                          </p:val>
-                                        </p:tav>
-                                      </p:tavLst>
-                                    </p:anim>
-                                    <p:anim calcmode="lin" valueType="num">
-                                      <p:cBhvr additive="base">
-                                        <p:cTn id="45" dur="500" fill="hold"/>
-                                        <p:tgtEl>
-                                          <p:spTgt spid="88068"/>
-                                        </p:tgtEl>
-                                        <p:attrNameLst>
-                                          <p:attrName>ppt_y</p:attrName>
-                                        </p:attrNameLst>
-                                      </p:cBhvr>
-                                      <p:tavLst>
-                                        <p:tav tm="0">
-                                          <p:val>
-                                            <p:strVal val="1+#ppt_h/2"/>
-                                          </p:val>
-                                        </p:tav>
-                                        <p:tav tm="100000">
-                                          <p:val>
-                                            <p:strVal val="#ppt_y"/>
-                                          </p:val>
-                                        </p:tav>
-                                      </p:tavLst>
-                                    </p:anim>
-                                  </p:childTnLst>
-                                </p:cTn>
-                              </p:par>
-                              <p:par>
-                                <p:cTn id="46" presetID="2" presetClass="entr" presetSubtype="4" fill="hold" nodeType="withEffect">
-                                  <p:stCondLst>
-                                    <p:cond delay="0"/>
-                                  </p:stCondLst>
-                                  <p:childTnLst>
-                                    <p:set>
-                                      <p:cBhvr>
-                                        <p:cTn id="47" dur="1" fill="hold">
-                                          <p:stCondLst>
-                                            <p:cond delay="0"/>
-                                          </p:stCondLst>
-                                        </p:cTn>
-                                        <p:tgtEl>
-                                          <p:spTgt spid="88069"/>
-                                        </p:tgtEl>
-                                        <p:attrNameLst>
-                                          <p:attrName>style.visibility</p:attrName>
-                                        </p:attrNameLst>
-                                      </p:cBhvr>
-                                      <p:to>
-                                        <p:strVal val="visible"/>
-                                      </p:to>
-                                    </p:set>
-                                    <p:anim calcmode="lin" valueType="num">
-                                      <p:cBhvr additive="base">
-                                        <p:cTn id="48" dur="500" fill="hold"/>
-                                        <p:tgtEl>
-                                          <p:spTgt spid="88069"/>
-                                        </p:tgtEl>
-                                        <p:attrNameLst>
-                                          <p:attrName>ppt_x</p:attrName>
-                                        </p:attrNameLst>
-                                      </p:cBhvr>
-                                      <p:tavLst>
-                                        <p:tav tm="0">
-                                          <p:val>
-                                            <p:strVal val="#ppt_x"/>
-                                          </p:val>
-                                        </p:tav>
-                                        <p:tav tm="100000">
-                                          <p:val>
-                                            <p:strVal val="#ppt_x"/>
-                                          </p:val>
-                                        </p:tav>
-                                      </p:tavLst>
-                                    </p:anim>
-                                    <p:anim calcmode="lin" valueType="num">
-                                      <p:cBhvr additive="base">
-                                        <p:cTn id="49" dur="500" fill="hold"/>
-                                        <p:tgtEl>
-                                          <p:spTgt spid="88069"/>
-                                        </p:tgtEl>
-                                        <p:attrNameLst>
-                                          <p:attrName>ppt_y</p:attrName>
-                                        </p:attrNameLst>
-                                      </p:cBhvr>
-                                      <p:tavLst>
-                                        <p:tav tm="0">
-                                          <p:val>
-                                            <p:strVal val="1+#ppt_h/2"/>
-                                          </p:val>
-                                        </p:tav>
-                                        <p:tav tm="100000">
-                                          <p:val>
-                                            <p:strVal val="#ppt_y"/>
-                                          </p:val>
-                                        </p:tav>
-                                      </p:tavLst>
-                                    </p:anim>
-                                  </p:childTnLst>
-                                </p:cTn>
-                              </p:par>
-                            </p:childTnLst>
-                          </p:cTn>
-                        </p:par>
-                      </p:childTnLst>
-                    </p:cTn>
-                  </p:par>
-                </p:childTnLst>
-              </p:cTn>
-              <p:prevCondLst>
-                <p:cond evt="onPrev" delay="0">
-                  <p:tgtEl>
-                    <p:sldTgt/>
-                  </p:tgtEl>
-                </p:cond>
-              </p:prevCondLst>
-              <p:nextCondLst>
-                <p:cond evt="onNext" delay="0">
-                  <p:tgtEl>
-                    <p:sldTgt/>
-                  </p:tgtEl>
-                </p:cond>
-              </p:nextCondLst>
-            </p:seq>
-          </p:childTnLst>
-        </p:cTn>
+        <p:cTn id="1" dur="indefinite" restart="never" nodeType="tmRoot"/>
       </p:par>
     </p:tnLst>
-    <p:bldLst>
-      <p:bldP spid="9" grpId="0"/>
-      <p:bldP spid="10" grpId="0"/>
-      <p:bldP spid="11" grpId="0"/>
-      <p:bldP spid="12" grpId="0"/>
-      <p:bldP spid="13" grpId="0" animBg="1"/>
-      <p:bldP spid="14" grpId="0" animBg="1"/>
-      <p:bldP spid="15" grpId="0" animBg="1"/>
-    </p:bldLst>
   </p:timing>
 </p:sld>
 </file>
@@ -11693,27 +10079,26 @@
           <a:lstStyle/>
           <a:p>
             <a:r>
-              <a:rPr lang="en-US" smtClean="0"/>
+              <a:rPr lang="en-US" dirty="0" smtClean="0"/>
               <a:t>MCSDK Overview</a:t>
             </a:r>
           </a:p>
           <a:p>
             <a:r>
-              <a:rPr lang="en-US" smtClean="0"/>
+              <a:rPr lang="en-US" dirty="0" smtClean="0"/>
               <a:t>Software Architecture</a:t>
             </a:r>
           </a:p>
           <a:p>
             <a:r>
-              <a:rPr lang="en-US" smtClean="0"/>
-              <a:t>Evaluation Module (EVM)</a:t>
+              <a:rPr lang="en-US" dirty="0" smtClean="0"/>
+              <a:t>Evaluation Module (</a:t>
             </a:r>
-          </a:p>
-          <a:p>
             <a:r>
               <a:rPr lang="en-US" smtClean="0"/>
-              <a:t>MCSDK Benefits</a:t>
+              <a:t>EVM)</a:t>
             </a:r>
+            <a:endParaRPr lang="en-US" dirty="0" smtClean="0"/>
           </a:p>
         </p:txBody>
       </p:sp>
@@ -11834,26 +10219,20 @@
           <a:lstStyle/>
           <a:p>
             <a:r>
-              <a:rPr lang="en-US" smtClean="0"/>
+              <a:rPr lang="en-US" dirty="0" smtClean="0"/>
               <a:t>MCSDK Overview</a:t>
             </a:r>
           </a:p>
           <a:p>
             <a:r>
-              <a:rPr lang="en-US" smtClean="0"/>
+              <a:rPr lang="en-US" dirty="0" smtClean="0"/>
               <a:t>Software Architecture</a:t>
             </a:r>
           </a:p>
           <a:p>
             <a:r>
-              <a:rPr lang="en-US" smtClean="0"/>
+              <a:rPr lang="en-US" dirty="0" smtClean="0"/>
               <a:t>Evaluation Module (EVM)</a:t>
-            </a:r>
-          </a:p>
-          <a:p>
-            <a:r>
-              <a:rPr lang="en-US" smtClean="0"/>
-              <a:t>MCSDK Benefits</a:t>
             </a:r>
           </a:p>
         </p:txBody>
@@ -12092,226 +10471,7 @@
   <p:timing>
     <p:tnLst>
       <p:par>
-        <p:cTn id="1" dur="indefinite" restart="never" nodeType="tmRoot">
-          <p:childTnLst>
-            <p:seq concurrent="1" nextAc="seek">
-              <p:cTn id="2" dur="indefinite" nodeType="mainSeq">
-                <p:childTnLst>
-                  <p:par>
-                    <p:cTn id="3" fill="hold">
-                      <p:stCondLst>
-                        <p:cond delay="indefinite"/>
-                      </p:stCondLst>
-                      <p:childTnLst>
-                        <p:par>
-                          <p:cTn id="4" fill="hold">
-                            <p:stCondLst>
-                              <p:cond delay="0"/>
-                            </p:stCondLst>
-                            <p:childTnLst>
-                              <p:par>
-                                <p:cTn id="5" presetID="1" presetClass="entr" presetSubtype="0" fill="hold" nodeType="clickEffect">
-                                  <p:stCondLst>
-                                    <p:cond delay="0"/>
-                                  </p:stCondLst>
-                                  <p:childTnLst>
-                                    <p:set>
-                                      <p:cBhvr>
-                                        <p:cTn id="6" dur="1" fill="hold">
-                                          <p:stCondLst>
-                                            <p:cond delay="0"/>
-                                          </p:stCondLst>
-                                        </p:cTn>
-                                        <p:tgtEl>
-                                          <p:spTgt spid="15362">
-                                            <p:txEl>
-                                              <p:pRg st="1" end="1"/>
-                                            </p:txEl>
-                                          </p:spTgt>
-                                        </p:tgtEl>
-                                        <p:attrNameLst>
-                                          <p:attrName>style.visibility</p:attrName>
-                                        </p:attrNameLst>
-                                      </p:cBhvr>
-                                      <p:to>
-                                        <p:strVal val="visible"/>
-                                      </p:to>
-                                    </p:set>
-                                  </p:childTnLst>
-                                </p:cTn>
-                              </p:par>
-                            </p:childTnLst>
-                          </p:cTn>
-                        </p:par>
-                      </p:childTnLst>
-                    </p:cTn>
-                  </p:par>
-                  <p:par>
-                    <p:cTn id="7" fill="hold">
-                      <p:stCondLst>
-                        <p:cond delay="indefinite"/>
-                      </p:stCondLst>
-                      <p:childTnLst>
-                        <p:par>
-                          <p:cTn id="8" fill="hold">
-                            <p:stCondLst>
-                              <p:cond delay="0"/>
-                            </p:stCondLst>
-                            <p:childTnLst>
-                              <p:par>
-                                <p:cTn id="9" presetID="1" presetClass="entr" presetSubtype="0" fill="hold" nodeType="clickEffect">
-                                  <p:stCondLst>
-                                    <p:cond delay="0"/>
-                                  </p:stCondLst>
-                                  <p:childTnLst>
-                                    <p:set>
-                                      <p:cBhvr>
-                                        <p:cTn id="10" dur="1" fill="hold">
-                                          <p:stCondLst>
-                                            <p:cond delay="0"/>
-                                          </p:stCondLst>
-                                        </p:cTn>
-                                        <p:tgtEl>
-                                          <p:spTgt spid="15362">
-                                            <p:txEl>
-                                              <p:pRg st="2" end="2"/>
-                                            </p:txEl>
-                                          </p:spTgt>
-                                        </p:tgtEl>
-                                        <p:attrNameLst>
-                                          <p:attrName>style.visibility</p:attrName>
-                                        </p:attrNameLst>
-                                      </p:cBhvr>
-                                      <p:to>
-                                        <p:strVal val="visible"/>
-                                      </p:to>
-                                    </p:set>
-                                  </p:childTnLst>
-                                </p:cTn>
-                              </p:par>
-                            </p:childTnLst>
-                          </p:cTn>
-                        </p:par>
-                      </p:childTnLst>
-                    </p:cTn>
-                  </p:par>
-                  <p:par>
-                    <p:cTn id="11" fill="hold">
-                      <p:stCondLst>
-                        <p:cond delay="indefinite"/>
-                      </p:stCondLst>
-                      <p:childTnLst>
-                        <p:par>
-                          <p:cTn id="12" fill="hold">
-                            <p:stCondLst>
-                              <p:cond delay="0"/>
-                            </p:stCondLst>
-                            <p:childTnLst>
-                              <p:par>
-                                <p:cTn id="13" presetID="1" presetClass="entr" presetSubtype="0" fill="hold" nodeType="clickEffect">
-                                  <p:stCondLst>
-                                    <p:cond delay="0"/>
-                                  </p:stCondLst>
-                                  <p:childTnLst>
-                                    <p:set>
-                                      <p:cBhvr>
-                                        <p:cTn id="14" dur="1" fill="hold">
-                                          <p:stCondLst>
-                                            <p:cond delay="0"/>
-                                          </p:stCondLst>
-                                        </p:cTn>
-                                        <p:tgtEl>
-                                          <p:spTgt spid="15362">
-                                            <p:txEl>
-                                              <p:pRg st="3" end="3"/>
-                                            </p:txEl>
-                                          </p:spTgt>
-                                        </p:tgtEl>
-                                        <p:attrNameLst>
-                                          <p:attrName>style.visibility</p:attrName>
-                                        </p:attrNameLst>
-                                      </p:cBhvr>
-                                      <p:to>
-                                        <p:strVal val="visible"/>
-                                      </p:to>
-                                    </p:set>
-                                  </p:childTnLst>
-                                </p:cTn>
-                              </p:par>
-                            </p:childTnLst>
-                          </p:cTn>
-                        </p:par>
-                      </p:childTnLst>
-                    </p:cTn>
-                  </p:par>
-                  <p:par>
-                    <p:cTn id="15" fill="hold">
-                      <p:stCondLst>
-                        <p:cond delay="indefinite"/>
-                      </p:stCondLst>
-                      <p:childTnLst>
-                        <p:par>
-                          <p:cTn id="16" fill="hold">
-                            <p:stCondLst>
-                              <p:cond delay="0"/>
-                            </p:stCondLst>
-                            <p:childTnLst>
-                              <p:par>
-                                <p:cTn id="17" presetID="1" presetClass="entr" presetSubtype="0" fill="hold" nodeType="clickEffect">
-                                  <p:stCondLst>
-                                    <p:cond delay="0"/>
-                                  </p:stCondLst>
-                                  <p:childTnLst>
-                                    <p:set>
-                                      <p:cBhvr>
-                                        <p:cTn id="18" dur="1" fill="hold">
-                                          <p:stCondLst>
-                                            <p:cond delay="0"/>
-                                          </p:stCondLst>
-                                        </p:cTn>
-                                        <p:tgtEl>
-                                          <p:spTgt spid="15362">
-                                            <p:txEl>
-                                              <p:pRg st="4" end="4"/>
-                                            </p:txEl>
-                                          </p:spTgt>
-                                        </p:tgtEl>
-                                        <p:attrNameLst>
-                                          <p:attrName>style.visibility</p:attrName>
-                                        </p:attrNameLst>
-                                      </p:cBhvr>
-                                      <p:to>
-                                        <p:strVal val="visible"/>
-                                      </p:to>
-                                    </p:set>
-                                  </p:childTnLst>
-                                </p:cTn>
-                              </p:par>
-                            </p:childTnLst>
-                          </p:cTn>
-                        </p:par>
-                      </p:childTnLst>
-                    </p:cTn>
-                  </p:par>
-                </p:childTnLst>
-              </p:cTn>
-              <p:prevCondLst>
-                <p:cond evt="onPrev" delay="0">
-                  <p:tgtEl>
-                    <p:sldTgt/>
-                  </p:tgtEl>
-                </p:cond>
-              </p:prevCondLst>
-              <p:nextCondLst>
-                <p:cond evt="onNext" delay="0">
-                  <p:tgtEl>
-                    <p:sldTgt/>
-                  </p:tgtEl>
-                </p:cond>
-              </p:nextCondLst>
-            </p:seq>
-          </p:childTnLst>
-        </p:cTn>
+        <p:cTn id="1" dur="indefinite" restart="never" nodeType="tmRoot"/>
       </p:par>
     </p:tnLst>
   </p:timing>
@@ -14697,26 +12857,20 @@
           <a:lstStyle/>
           <a:p>
             <a:r>
-              <a:rPr lang="en-US" smtClean="0"/>
+              <a:rPr lang="en-US" dirty="0" smtClean="0"/>
               <a:t>MCSDK Overview</a:t>
             </a:r>
           </a:p>
           <a:p>
             <a:r>
-              <a:rPr lang="en-US" smtClean="0"/>
+              <a:rPr lang="en-US" dirty="0" smtClean="0"/>
               <a:t>Software Architecture</a:t>
             </a:r>
           </a:p>
           <a:p>
             <a:r>
-              <a:rPr lang="en-US" smtClean="0"/>
+              <a:rPr lang="en-US" dirty="0" smtClean="0"/>
               <a:t>Evaluation Module (EVM)</a:t>
-            </a:r>
-          </a:p>
-          <a:p>
-            <a:r>
-              <a:rPr lang="en-US" smtClean="0"/>
-              <a:t>MCSDK Benefits</a:t>
             </a:r>
           </a:p>
         </p:txBody>
@@ -14792,9 +12946,9 @@
         <p:grpSpPr>
           <a:xfrm>
             <a:off x="3516313" y="4914900"/>
-            <a:ext cx="2484437" cy="1127125"/>
+            <a:ext cx="2484437" cy="1132849"/>
             <a:chOff x="3516313" y="4914900"/>
-            <a:chExt cx="2484437" cy="1127125"/>
+            <a:chExt cx="2484437" cy="1132849"/>
           </a:xfrm>
         </p:grpSpPr>
         <p:sp>
@@ -14813,12 +12967,10 @@
             <a:prstGeom prst="rect">
               <a:avLst/>
             </a:prstGeom>
-            <a:solidFill>
-              <a:schemeClr val="accent3">
-                <a:lumMod val="40000"/>
-                <a:lumOff val="60000"/>
-              </a:schemeClr>
-            </a:solidFill>
+            <a:blipFill>
+              <a:blip r:embed="rId9" cstate="print"/>
+              <a:tile tx="0" ty="0" sx="100000" sy="100000" flip="none" algn="tl"/>
+            </a:blipFill>
             <a:ln w="9525" algn="ctr">
               <a:solidFill>
                 <a:srgbClr val="808080"/>
@@ -14892,7 +13044,7 @@
               <a:avLst/>
             </a:prstGeom>
             <a:solidFill>
-              <a:schemeClr val="accent2">
+              <a:schemeClr val="accent5">
                 <a:lumMod val="40000"/>
                 <a:lumOff val="60000"/>
               </a:schemeClr>
@@ -14960,7 +13112,7 @@
                 <a:buSzPct val="85000"/>
               </a:pPr>
               <a:r>
-                <a:rPr lang="en-US" sz="900">
+                <a:rPr lang="en-US" sz="900" b="1">
                   <a:latin typeface="Trebuchet MS" pitchFamily="34" charset="0"/>
                 </a:rPr>
                 <a:t>May be used “as is” or customer can implement value-add modifications</a:t>
@@ -14979,7 +13131,7 @@
           <p:spPr bwMode="auto">
             <a:xfrm>
               <a:off x="3849688" y="5705475"/>
-              <a:ext cx="2151062" cy="336550"/>
+              <a:ext cx="2151062" cy="342274"/>
             </a:xfrm>
             <a:prstGeom prst="rect">
               <a:avLst/>
@@ -15011,7 +13163,7 @@
                 <a:buSzPct val="85000"/>
               </a:pPr>
               <a:r>
-                <a:rPr lang="en-US" sz="900">
+                <a:rPr lang="en-US" sz="900" b="1">
                   <a:latin typeface="Trebuchet MS" pitchFamily="34" charset="0"/>
                 </a:rPr>
                 <a:t>Needs to be modified or replaced with customer version</a:t>
@@ -15030,7 +13182,7 @@
           <p:spPr bwMode="auto">
             <a:xfrm>
               <a:off x="3849688" y="4914900"/>
-              <a:ext cx="2151062" cy="214313"/>
+              <a:ext cx="2151062" cy="217625"/>
             </a:xfrm>
             <a:prstGeom prst="rect">
               <a:avLst/>
@@ -15062,7 +13214,7 @@
                 <a:buSzPct val="85000"/>
               </a:pPr>
               <a:r>
-                <a:rPr lang="en-US" sz="900">
+                <a:rPr lang="en-US" sz="900" b="1" dirty="0">
                   <a:latin typeface="Trebuchet MS" pitchFamily="34" charset="0"/>
                 </a:rPr>
                 <a:t>No modifications required</a:t>
@@ -15144,12 +13296,10 @@
             <a:prstGeom prst="rect">
               <a:avLst/>
             </a:prstGeom>
-            <a:solidFill>
-              <a:schemeClr val="accent3">
-                <a:lumMod val="40000"/>
-                <a:lumOff val="60000"/>
-              </a:schemeClr>
-            </a:solidFill>
+            <a:blipFill>
+              <a:blip r:embed="rId9" cstate="print"/>
+              <a:tile tx="0" ty="0" sx="100000" sy="100000" flip="none" algn="tl"/>
+            </a:blipFill>
             <a:ln w="9525" algn="ctr">
               <a:solidFill>
                 <a:srgbClr val="808080"/>
@@ -15181,7 +13331,7 @@
           <p:spPr bwMode="auto">
             <a:xfrm>
               <a:off x="269875" y="4197350"/>
-              <a:ext cx="1766888" cy="201613"/>
+              <a:ext cx="1766888" cy="203775"/>
             </a:xfrm>
             <a:prstGeom prst="rect">
               <a:avLst/>
@@ -15213,7 +13363,7 @@
                 <a:buSzPct val="85000"/>
               </a:pPr>
               <a:r>
-                <a:rPr lang="en-US" sz="800">
+                <a:rPr lang="en-US" sz="800" b="1">
                   <a:latin typeface="Trebuchet MS" pitchFamily="34" charset="0"/>
                 </a:rPr>
                 <a:t>CSL</a:t>
@@ -15238,7 +13388,7 @@
               <a:avLst/>
             </a:prstGeom>
             <a:solidFill>
-              <a:schemeClr val="accent2">
+              <a:schemeClr val="accent5">
                 <a:lumMod val="40000"/>
                 <a:lumOff val="60000"/>
               </a:schemeClr>
@@ -15274,7 +13424,7 @@
           <p:spPr bwMode="auto">
             <a:xfrm>
               <a:off x="1192213" y="3629025"/>
-              <a:ext cx="882650" cy="201613"/>
+              <a:ext cx="882650" cy="203775"/>
             </a:xfrm>
             <a:prstGeom prst="rect">
               <a:avLst/>
@@ -15306,7 +13456,7 @@
                 <a:buSzPct val="85000"/>
               </a:pPr>
               <a:r>
-                <a:rPr lang="en-US" sz="800">
+                <a:rPr lang="en-US" sz="800" b="1">
                   <a:latin typeface="Trebuchet MS" pitchFamily="34" charset="0"/>
                 </a:rPr>
                 <a:t>TI Platform</a:t>
@@ -15361,7 +13511,7 @@
           <p:spPr bwMode="auto">
             <a:xfrm>
               <a:off x="1192213" y="3044825"/>
-              <a:ext cx="736600" cy="334963"/>
+              <a:ext cx="736600" cy="339196"/>
             </a:xfrm>
             <a:prstGeom prst="rect">
               <a:avLst/>
@@ -15393,7 +13543,7 @@
                 <a:buSzPct val="85000"/>
               </a:pPr>
               <a:r>
-                <a:rPr lang="en-US" sz="800">
+                <a:rPr lang="en-US" sz="800" b="1">
                   <a:latin typeface="Trebuchet MS" pitchFamily="34" charset="0"/>
                 </a:rPr>
                 <a:t>Network</a:t>
@@ -15413,7 +13563,7 @@
                 <a:buSzPct val="85000"/>
               </a:pPr>
               <a:r>
-                <a:rPr lang="en-US" sz="800">
+                <a:rPr lang="en-US" sz="800" b="1">
                   <a:latin typeface="Trebuchet MS" pitchFamily="34" charset="0"/>
                 </a:rPr>
                 <a:t>Dev Kit</a:t>
@@ -15432,7 +13582,7 @@
           <p:spPr bwMode="auto">
             <a:xfrm>
               <a:off x="247650" y="2154238"/>
-              <a:ext cx="1827213" cy="201613"/>
+              <a:ext cx="1827213" cy="203775"/>
             </a:xfrm>
             <a:prstGeom prst="rect">
               <a:avLst/>
@@ -15464,7 +13614,7 @@
                 <a:buSzPct val="85000"/>
               </a:pPr>
               <a:r>
-                <a:rPr lang="en-US" sz="800">
+                <a:rPr lang="en-US" sz="800" b="1">
                   <a:latin typeface="Trebuchet MS" pitchFamily="34" charset="0"/>
                 </a:rPr>
                 <a:t>Demo Application</a:t>
@@ -15539,12 +13689,10 @@
             <a:prstGeom prst="rect">
               <a:avLst/>
             </a:prstGeom>
-            <a:solidFill>
-              <a:schemeClr val="accent3">
-                <a:lumMod val="40000"/>
-                <a:lumOff val="60000"/>
-              </a:schemeClr>
-            </a:solidFill>
+            <a:blipFill>
+              <a:blip r:embed="rId9" cstate="print"/>
+              <a:tile tx="0" ty="0" sx="100000" sy="100000" flip="none" algn="tl"/>
+            </a:blipFill>
             <a:ln w="9525" algn="ctr">
               <a:solidFill>
                 <a:srgbClr val="808080"/>
@@ -15581,12 +13729,10 @@
             <a:prstGeom prst="rect">
               <a:avLst/>
             </a:prstGeom>
-            <a:solidFill>
-              <a:schemeClr val="accent3">
-                <a:lumMod val="40000"/>
-                <a:lumOff val="60000"/>
-              </a:schemeClr>
-            </a:solidFill>
+            <a:blipFill>
+              <a:blip r:embed="rId9" cstate="print"/>
+              <a:tile tx="0" ty="0" sx="100000" sy="100000" flip="none" algn="tl"/>
+            </a:blipFill>
             <a:ln w="9525" algn="ctr">
               <a:solidFill>
                 <a:srgbClr val="808080"/>
@@ -15618,7 +13764,7 @@
           <p:spPr bwMode="auto">
             <a:xfrm>
               <a:off x="730250" y="3505200"/>
-              <a:ext cx="461963" cy="201613"/>
+              <a:ext cx="461963" cy="203775"/>
             </a:xfrm>
             <a:prstGeom prst="rect">
               <a:avLst/>
@@ -15650,7 +13796,7 @@
                 <a:buSzPct val="85000"/>
               </a:pPr>
               <a:r>
-                <a:rPr lang="en-US" sz="800">
+                <a:rPr lang="en-US" sz="800" b="1">
                   <a:latin typeface="Trebuchet MS" pitchFamily="34" charset="0"/>
                 </a:rPr>
                 <a:t>IPC</a:t>
@@ -15669,7 +13815,7 @@
           <p:spPr bwMode="auto">
             <a:xfrm>
               <a:off x="269875" y="3505200"/>
-              <a:ext cx="461963" cy="201613"/>
+              <a:ext cx="461963" cy="203775"/>
             </a:xfrm>
             <a:prstGeom prst="rect">
               <a:avLst/>
@@ -15701,7 +13847,7 @@
                 <a:buSzPct val="85000"/>
               </a:pPr>
               <a:r>
-                <a:rPr lang="en-US" sz="800">
+                <a:rPr lang="en-US" sz="800" b="1">
                   <a:latin typeface="Trebuchet MS" pitchFamily="34" charset="0"/>
                 </a:rPr>
                 <a:t>LLD</a:t>
@@ -15725,12 +13871,10 @@
             <a:prstGeom prst="rect">
               <a:avLst/>
             </a:prstGeom>
-            <a:solidFill>
-              <a:schemeClr val="accent3">
-                <a:lumMod val="40000"/>
-                <a:lumOff val="60000"/>
-              </a:schemeClr>
-            </a:solidFill>
+            <a:blipFill>
+              <a:blip r:embed="rId9" cstate="print"/>
+              <a:tile tx="0" ty="0" sx="100000" sy="100000" flip="none" algn="tl"/>
+            </a:blipFill>
             <a:ln w="9525" algn="ctr">
               <a:solidFill>
                 <a:srgbClr val="808080"/>
@@ -15767,12 +13911,10 @@
             <a:prstGeom prst="rect">
               <a:avLst/>
             </a:prstGeom>
-            <a:solidFill>
-              <a:schemeClr val="accent3">
-                <a:lumMod val="40000"/>
-                <a:lumOff val="60000"/>
-              </a:schemeClr>
-            </a:solidFill>
+            <a:blipFill>
+              <a:blip r:embed="rId9" cstate="print"/>
+              <a:tile tx="0" ty="0" sx="100000" sy="100000" flip="none" algn="tl"/>
+            </a:blipFill>
             <a:ln w="9525" algn="ctr">
               <a:solidFill>
                 <a:srgbClr val="808080"/>
@@ -15804,7 +13946,7 @@
           <p:spPr bwMode="auto">
             <a:xfrm>
               <a:off x="730250" y="2698750"/>
-              <a:ext cx="500063" cy="311150"/>
+              <a:ext cx="500063" cy="314574"/>
             </a:xfrm>
             <a:prstGeom prst="rect">
               <a:avLst/>
@@ -15836,7 +13978,7 @@
                 <a:buSzPct val="85000"/>
               </a:pPr>
               <a:r>
-                <a:rPr lang="en-US" sz="800">
+                <a:rPr lang="en-US" sz="800" b="1">
                   <a:latin typeface="Trebuchet MS" pitchFamily="34" charset="0"/>
                 </a:rPr>
                 <a:t>EDMA, Etc</a:t>
@@ -15855,7 +13997,7 @@
           <p:spPr bwMode="auto">
             <a:xfrm>
               <a:off x="269875" y="2660650"/>
-              <a:ext cx="461963" cy="334963"/>
+              <a:ext cx="461963" cy="339196"/>
             </a:xfrm>
             <a:prstGeom prst="rect">
               <a:avLst/>
@@ -15887,7 +14029,7 @@
                 <a:buSzPct val="85000"/>
               </a:pPr>
               <a:r>
-                <a:rPr lang="en-US" sz="800">
+                <a:rPr lang="en-US" sz="800" b="1" dirty="0">
                   <a:latin typeface="Trebuchet MS" pitchFamily="34" charset="0"/>
                 </a:rPr>
                 <a:t>Tools</a:t>
@@ -15907,7 +14049,7 @@
                 <a:buSzPct val="85000"/>
               </a:pPr>
               <a:r>
-                <a:rPr lang="en-US" sz="800">
+                <a:rPr lang="en-US" sz="800" b="1" dirty="0">
                   <a:latin typeface="Trebuchet MS" pitchFamily="34" charset="0"/>
                 </a:rPr>
                 <a:t>(UIA)</a:t>
@@ -16026,12 +14168,10 @@
             <a:prstGeom prst="rect">
               <a:avLst/>
             </a:prstGeom>
-            <a:solidFill>
-              <a:schemeClr val="accent3">
-                <a:lumMod val="40000"/>
-                <a:lumOff val="60000"/>
-              </a:schemeClr>
-            </a:solidFill>
+            <a:blipFill>
+              <a:blip r:embed="rId9" cstate="print"/>
+              <a:tile tx="0" ty="0" sx="100000" sy="100000" flip="none" algn="tl"/>
+            </a:blipFill>
             <a:ln w="9525" algn="ctr">
               <a:solidFill>
                 <a:srgbClr val="808080"/>
@@ -16063,7 +14203,7 @@
           <p:spPr bwMode="auto">
             <a:xfrm>
               <a:off x="2535238" y="4197351"/>
-              <a:ext cx="1766888" cy="201613"/>
+              <a:ext cx="1766888" cy="203775"/>
             </a:xfrm>
             <a:prstGeom prst="rect">
               <a:avLst/>
@@ -16095,7 +14235,7 @@
                 <a:buSzPct val="85000"/>
               </a:pPr>
               <a:r>
-                <a:rPr lang="en-US" sz="800">
+                <a:rPr lang="en-US" sz="800" b="1">
                   <a:latin typeface="Trebuchet MS" pitchFamily="34" charset="0"/>
                 </a:rPr>
                 <a:t>CSL</a:t>
@@ -16120,7 +14260,7 @@
               <a:avLst/>
             </a:prstGeom>
             <a:solidFill>
-              <a:schemeClr val="accent2">
+              <a:schemeClr val="accent5">
                 <a:lumMod val="40000"/>
                 <a:lumOff val="60000"/>
               </a:schemeClr>
@@ -16269,12 +14409,10 @@
             <a:prstGeom prst="rect">
               <a:avLst/>
             </a:prstGeom>
-            <a:solidFill>
-              <a:schemeClr val="accent3">
-                <a:lumMod val="40000"/>
-                <a:lumOff val="60000"/>
-              </a:schemeClr>
-            </a:solidFill>
+            <a:blipFill>
+              <a:blip r:embed="rId9" cstate="print"/>
+              <a:tile tx="0" ty="0" sx="100000" sy="100000" flip="none" algn="tl"/>
+            </a:blipFill>
             <a:ln w="9525" algn="ctr">
               <a:solidFill>
                 <a:srgbClr val="808080"/>
@@ -16311,12 +14449,10 @@
             <a:prstGeom prst="rect">
               <a:avLst/>
             </a:prstGeom>
-            <a:solidFill>
-              <a:schemeClr val="accent3">
-                <a:lumMod val="40000"/>
-                <a:lumOff val="60000"/>
-              </a:schemeClr>
-            </a:solidFill>
+            <a:blipFill>
+              <a:blip r:embed="rId9" cstate="print"/>
+              <a:tile tx="0" ty="0" sx="100000" sy="100000" flip="none" algn="tl"/>
+            </a:blipFill>
             <a:ln w="9525" algn="ctr">
               <a:solidFill>
                 <a:srgbClr val="808080"/>
@@ -16348,7 +14484,7 @@
           <p:spPr bwMode="auto">
             <a:xfrm>
               <a:off x="2995613" y="3505201"/>
-              <a:ext cx="461963" cy="201613"/>
+              <a:ext cx="461963" cy="203775"/>
             </a:xfrm>
             <a:prstGeom prst="rect">
               <a:avLst/>
@@ -16380,7 +14516,7 @@
                 <a:buSzPct val="85000"/>
               </a:pPr>
               <a:r>
-                <a:rPr lang="en-US" sz="800">
+                <a:rPr lang="en-US" sz="800" b="1">
                   <a:latin typeface="Trebuchet MS" pitchFamily="34" charset="0"/>
                 </a:rPr>
                 <a:t>IPC</a:t>
@@ -16399,7 +14535,7 @@
           <p:spPr bwMode="auto">
             <a:xfrm>
               <a:off x="2535238" y="3505201"/>
-              <a:ext cx="461963" cy="201613"/>
+              <a:ext cx="461963" cy="203775"/>
             </a:xfrm>
             <a:prstGeom prst="rect">
               <a:avLst/>
@@ -16431,7 +14567,7 @@
                 <a:buSzPct val="85000"/>
               </a:pPr>
               <a:r>
-                <a:rPr lang="en-US" sz="800">
+                <a:rPr lang="en-US" sz="800" b="1">
                   <a:latin typeface="Trebuchet MS" pitchFamily="34" charset="0"/>
                 </a:rPr>
                 <a:t>LLD</a:t>
@@ -16486,7 +14622,7 @@
           <p:spPr bwMode="auto">
             <a:xfrm>
               <a:off x="3457576" y="3044826"/>
-              <a:ext cx="736600" cy="334963"/>
+              <a:ext cx="736600" cy="339196"/>
             </a:xfrm>
             <a:prstGeom prst="rect">
               <a:avLst/>
@@ -16518,7 +14654,7 @@
                 <a:buSzPct val="85000"/>
               </a:pPr>
               <a:r>
-                <a:rPr lang="en-US" sz="800">
+                <a:rPr lang="en-US" sz="800" b="1">
                   <a:latin typeface="Trebuchet MS" pitchFamily="34" charset="0"/>
                 </a:rPr>
                 <a:t>Network</a:t>
@@ -16538,7 +14674,7 @@
                 <a:buSzPct val="85000"/>
               </a:pPr>
               <a:r>
-                <a:rPr lang="en-US" sz="800">
+                <a:rPr lang="en-US" sz="800" b="1">
                   <a:latin typeface="Trebuchet MS" pitchFamily="34" charset="0"/>
                 </a:rPr>
                 <a:t>Dev Kit</a:t>
@@ -16562,12 +14698,10 @@
             <a:prstGeom prst="rect">
               <a:avLst/>
             </a:prstGeom>
-            <a:solidFill>
-              <a:schemeClr val="accent3">
-                <a:lumMod val="40000"/>
-                <a:lumOff val="60000"/>
-              </a:schemeClr>
-            </a:solidFill>
+            <a:blipFill>
+              <a:blip r:embed="rId9" cstate="print"/>
+              <a:tile tx="0" ty="0" sx="100000" sy="100000" flip="none" algn="tl"/>
+            </a:blipFill>
             <a:ln w="9525" algn="ctr">
               <a:solidFill>
                 <a:srgbClr val="808080"/>
@@ -16604,12 +14738,10 @@
             <a:prstGeom prst="rect">
               <a:avLst/>
             </a:prstGeom>
-            <a:solidFill>
-              <a:schemeClr val="accent3">
-                <a:lumMod val="40000"/>
-                <a:lumOff val="60000"/>
-              </a:schemeClr>
-            </a:solidFill>
+            <a:blipFill>
+              <a:blip r:embed="rId9" cstate="print"/>
+              <a:tile tx="0" ty="0" sx="100000" sy="100000" flip="none" algn="tl"/>
+            </a:blipFill>
             <a:ln w="9525" algn="ctr">
               <a:solidFill>
                 <a:srgbClr val="808080"/>
@@ -16641,7 +14773,7 @@
           <p:spPr bwMode="auto">
             <a:xfrm>
               <a:off x="2995613" y="2698751"/>
-              <a:ext cx="500063" cy="311150"/>
+              <a:ext cx="500063" cy="314574"/>
             </a:xfrm>
             <a:prstGeom prst="rect">
               <a:avLst/>
@@ -16673,7 +14805,7 @@
                 <a:buSzPct val="85000"/>
               </a:pPr>
               <a:r>
-                <a:rPr lang="en-US" sz="800">
+                <a:rPr lang="en-US" sz="800" b="1">
                   <a:latin typeface="Trebuchet MS" pitchFamily="34" charset="0"/>
                 </a:rPr>
                 <a:t>EDMA, Etc</a:t>
@@ -16692,7 +14824,7 @@
           <p:spPr bwMode="auto">
             <a:xfrm>
               <a:off x="2535238" y="2660651"/>
-              <a:ext cx="461963" cy="334963"/>
+              <a:ext cx="461963" cy="339196"/>
             </a:xfrm>
             <a:prstGeom prst="rect">
               <a:avLst/>
@@ -16724,7 +14856,7 @@
                 <a:buSzPct val="85000"/>
               </a:pPr>
               <a:r>
-                <a:rPr lang="en-US" sz="800">
+                <a:rPr lang="en-US" sz="800" b="1">
                   <a:latin typeface="Trebuchet MS" pitchFamily="34" charset="0"/>
                 </a:rPr>
                 <a:t>Tools</a:t>
@@ -16744,7 +14876,7 @@
                 <a:buSzPct val="85000"/>
               </a:pPr>
               <a:r>
-                <a:rPr lang="en-US" sz="800">
+                <a:rPr lang="en-US" sz="800" b="1">
                   <a:latin typeface="Trebuchet MS" pitchFamily="34" charset="0"/>
                 </a:rPr>
                 <a:t>(UIA)</a:t>
@@ -16763,7 +14895,7 @@
           <p:spPr bwMode="auto">
             <a:xfrm>
               <a:off x="2514601" y="2135188"/>
-              <a:ext cx="1827213" cy="201613"/>
+              <a:ext cx="1827213" cy="203775"/>
             </a:xfrm>
             <a:prstGeom prst="rect">
               <a:avLst/>
@@ -16795,7 +14927,7 @@
                 <a:buSzPct val="85000"/>
               </a:pPr>
               <a:r>
-                <a:rPr lang="en-US" sz="800">
+                <a:rPr lang="en-US" sz="800" b="1" dirty="0">
                   <a:latin typeface="Trebuchet MS" pitchFamily="34" charset="0"/>
                 </a:rPr>
                 <a:t>Demo Application</a:t>
@@ -16841,7 +14973,7 @@
               <a:avLst/>
             </a:prstGeom>
             <a:solidFill>
-              <a:schemeClr val="accent2">
+              <a:schemeClr val="accent5">
                 <a:lumMod val="40000"/>
                 <a:lumOff val="60000"/>
               </a:schemeClr>
@@ -16919,12 +15051,10 @@
             <a:prstGeom prst="rect">
               <a:avLst/>
             </a:prstGeom>
-            <a:solidFill>
-              <a:schemeClr val="accent3">
-                <a:lumMod val="40000"/>
-                <a:lumOff val="60000"/>
-              </a:schemeClr>
-            </a:solidFill>
+            <a:blipFill>
+              <a:blip r:embed="rId9" cstate="print"/>
+              <a:tile tx="0" ty="0" sx="100000" sy="100000" flip="none" algn="tl"/>
+            </a:blipFill>
             <a:ln w="9525" algn="ctr">
               <a:solidFill>
                 <a:srgbClr val="808080"/>
@@ -16956,7 +15086,7 @@
           <p:spPr bwMode="auto">
             <a:xfrm>
               <a:off x="4800600" y="4197350"/>
-              <a:ext cx="1766888" cy="201613"/>
+              <a:ext cx="1766888" cy="203775"/>
             </a:xfrm>
             <a:prstGeom prst="rect">
               <a:avLst/>
@@ -16988,7 +15118,7 @@
                 <a:buSzPct val="85000"/>
               </a:pPr>
               <a:r>
-                <a:rPr lang="en-US" sz="800">
+                <a:rPr lang="en-US" sz="800" b="1">
                   <a:latin typeface="Trebuchet MS" pitchFamily="34" charset="0"/>
                 </a:rPr>
                 <a:t>CSL</a:t>
@@ -17013,7 +15143,7 @@
               <a:avLst/>
             </a:prstGeom>
             <a:solidFill>
-              <a:schemeClr val="accent2">
+              <a:schemeClr val="accent5">
                 <a:lumMod val="40000"/>
                 <a:lumOff val="60000"/>
               </a:schemeClr>
@@ -17136,7 +15266,7 @@
           <p:spPr bwMode="auto">
             <a:xfrm>
               <a:off x="5722938" y="3044825"/>
-              <a:ext cx="736600" cy="334963"/>
+              <a:ext cx="736600" cy="339196"/>
             </a:xfrm>
             <a:prstGeom prst="rect">
               <a:avLst/>
@@ -17168,7 +15298,7 @@
                 <a:buSzPct val="85000"/>
               </a:pPr>
               <a:r>
-                <a:rPr lang="en-US" sz="800">
+                <a:rPr lang="en-US" sz="800" b="1">
                   <a:latin typeface="Trebuchet MS" pitchFamily="34" charset="0"/>
                 </a:rPr>
                 <a:t>Network</a:t>
@@ -17188,7 +15318,7 @@
                 <a:buSzPct val="85000"/>
               </a:pPr>
               <a:r>
-                <a:rPr lang="en-US" sz="800">
+                <a:rPr lang="en-US" sz="800" b="1">
                   <a:latin typeface="Trebuchet MS" pitchFamily="34" charset="0"/>
                 </a:rPr>
                 <a:t>Dev Kit</a:t>
@@ -17212,12 +15342,10 @@
             <a:prstGeom prst="rect">
               <a:avLst/>
             </a:prstGeom>
-            <a:solidFill>
-              <a:schemeClr val="accent3">
-                <a:lumMod val="40000"/>
-                <a:lumOff val="60000"/>
-              </a:schemeClr>
-            </a:solidFill>
+            <a:blipFill>
+              <a:blip r:embed="rId9" cstate="print"/>
+              <a:tile tx="0" ty="0" sx="100000" sy="100000" flip="none" algn="tl"/>
+            </a:blipFill>
             <a:ln w="9525" algn="ctr">
               <a:solidFill>
                 <a:srgbClr val="808080"/>
@@ -17254,12 +15382,10 @@
             <a:prstGeom prst="rect">
               <a:avLst/>
             </a:prstGeom>
-            <a:solidFill>
-              <a:schemeClr val="accent3">
-                <a:lumMod val="40000"/>
-                <a:lumOff val="60000"/>
-              </a:schemeClr>
-            </a:solidFill>
+            <a:blipFill>
+              <a:blip r:embed="rId9" cstate="print"/>
+              <a:tile tx="0" ty="0" sx="100000" sy="100000" flip="none" algn="tl"/>
+            </a:blipFill>
             <a:ln w="9525" algn="ctr">
               <a:solidFill>
                 <a:srgbClr val="808080"/>
@@ -17291,7 +15417,7 @@
           <p:spPr bwMode="auto">
             <a:xfrm>
               <a:off x="5260975" y="3505200"/>
-              <a:ext cx="461963" cy="201613"/>
+              <a:ext cx="461963" cy="203775"/>
             </a:xfrm>
             <a:prstGeom prst="rect">
               <a:avLst/>
@@ -17323,7 +15449,7 @@
                 <a:buSzPct val="85000"/>
               </a:pPr>
               <a:r>
-                <a:rPr lang="en-US" sz="800">
+                <a:rPr lang="en-US" sz="800" b="1">
                   <a:latin typeface="Trebuchet MS" pitchFamily="34" charset="0"/>
                 </a:rPr>
                 <a:t>IPC</a:t>
@@ -17342,7 +15468,7 @@
           <p:spPr bwMode="auto">
             <a:xfrm>
               <a:off x="4800600" y="3505200"/>
-              <a:ext cx="461963" cy="201613"/>
+              <a:ext cx="461963" cy="203775"/>
             </a:xfrm>
             <a:prstGeom prst="rect">
               <a:avLst/>
@@ -17374,7 +15500,7 @@
                 <a:buSzPct val="85000"/>
               </a:pPr>
               <a:r>
-                <a:rPr lang="en-US" sz="800">
+                <a:rPr lang="en-US" sz="800" b="1">
                   <a:latin typeface="Trebuchet MS" pitchFamily="34" charset="0"/>
                 </a:rPr>
                 <a:t>LLD</a:t>
@@ -17398,12 +15524,10 @@
             <a:prstGeom prst="rect">
               <a:avLst/>
             </a:prstGeom>
-            <a:solidFill>
-              <a:schemeClr val="accent3">
-                <a:lumMod val="40000"/>
-                <a:lumOff val="60000"/>
-              </a:schemeClr>
-            </a:solidFill>
+            <a:blipFill>
+              <a:blip r:embed="rId9" cstate="print"/>
+              <a:tile tx="0" ty="0" sx="100000" sy="100000" flip="none" algn="tl"/>
+            </a:blipFill>
             <a:ln w="9525" algn="ctr">
               <a:solidFill>
                 <a:srgbClr val="808080"/>
@@ -17440,12 +15564,10 @@
             <a:prstGeom prst="rect">
               <a:avLst/>
             </a:prstGeom>
-            <a:solidFill>
-              <a:schemeClr val="accent3">
-                <a:lumMod val="40000"/>
-                <a:lumOff val="60000"/>
-              </a:schemeClr>
-            </a:solidFill>
+            <a:blipFill>
+              <a:blip r:embed="rId9" cstate="print"/>
+              <a:tile tx="0" ty="0" sx="100000" sy="100000" flip="none" algn="tl"/>
+            </a:blipFill>
             <a:ln w="9525" algn="ctr">
               <a:solidFill>
                 <a:srgbClr val="808080"/>
@@ -17477,7 +15599,7 @@
           <p:spPr bwMode="auto">
             <a:xfrm>
               <a:off x="5260975" y="2698750"/>
-              <a:ext cx="500063" cy="311150"/>
+              <a:ext cx="500063" cy="314574"/>
             </a:xfrm>
             <a:prstGeom prst="rect">
               <a:avLst/>
@@ -17509,7 +15631,7 @@
                 <a:buSzPct val="85000"/>
               </a:pPr>
               <a:r>
-                <a:rPr lang="en-US" sz="800">
+                <a:rPr lang="en-US" sz="800" b="1">
                   <a:latin typeface="Trebuchet MS" pitchFamily="34" charset="0"/>
                 </a:rPr>
                 <a:t>EDMA, Etc</a:t>
@@ -17528,7 +15650,7 @@
           <p:spPr bwMode="auto">
             <a:xfrm>
               <a:off x="4800600" y="2660650"/>
-              <a:ext cx="461963" cy="334963"/>
+              <a:ext cx="461963" cy="339196"/>
             </a:xfrm>
             <a:prstGeom prst="rect">
               <a:avLst/>
@@ -17560,7 +15682,7 @@
                 <a:buSzPct val="85000"/>
               </a:pPr>
               <a:r>
-                <a:rPr lang="en-US" sz="800">
+                <a:rPr lang="en-US" sz="800" b="1" dirty="0">
                   <a:latin typeface="Trebuchet MS" pitchFamily="34" charset="0"/>
                 </a:rPr>
                 <a:t>Tools</a:t>
@@ -17580,7 +15702,7 @@
                 <a:buSzPct val="85000"/>
               </a:pPr>
               <a:r>
-                <a:rPr lang="en-US" sz="800">
+                <a:rPr lang="en-US" sz="800" b="1" dirty="0">
                   <a:latin typeface="Trebuchet MS" pitchFamily="34" charset="0"/>
                 </a:rPr>
                 <a:t>(UIA)</a:t>
@@ -17768,7 +15890,7 @@
               <a:avLst/>
             </a:prstGeom>
             <a:solidFill>
-              <a:schemeClr val="accent2">
+              <a:schemeClr val="accent5">
                 <a:lumMod val="40000"/>
                 <a:lumOff val="60000"/>
               </a:schemeClr>
@@ -17846,12 +15968,10 @@
             <a:prstGeom prst="rect">
               <a:avLst/>
             </a:prstGeom>
-            <a:solidFill>
-              <a:schemeClr val="accent3">
-                <a:lumMod val="40000"/>
-                <a:lumOff val="60000"/>
-              </a:schemeClr>
-            </a:solidFill>
+            <a:blipFill>
+              <a:blip r:embed="rId9" cstate="print"/>
+              <a:tile tx="0" ty="0" sx="100000" sy="100000" flip="none" algn="tl"/>
+            </a:blipFill>
             <a:ln w="9525" algn="ctr">
               <a:solidFill>
                 <a:srgbClr val="808080"/>
@@ -17883,7 +16003,7 @@
           <p:spPr bwMode="auto">
             <a:xfrm>
               <a:off x="4452" y="2644"/>
-              <a:ext cx="1113" cy="127"/>
+              <a:ext cx="1113" cy="128"/>
             </a:xfrm>
             <a:prstGeom prst="rect">
               <a:avLst/>
@@ -17915,7 +16035,7 @@
                 <a:buSzPct val="85000"/>
               </a:pPr>
               <a:r>
-                <a:rPr lang="en-US" sz="800">
+                <a:rPr lang="en-US" sz="800" b="1">
                   <a:latin typeface="Trebuchet MS" pitchFamily="34" charset="0"/>
                 </a:rPr>
                 <a:t>CSL</a:t>
@@ -17940,7 +16060,7 @@
               <a:avLst/>
             </a:prstGeom>
             <a:solidFill>
-              <a:schemeClr val="accent2">
+              <a:schemeClr val="accent5">
                 <a:lumMod val="40000"/>
                 <a:lumOff val="60000"/>
               </a:schemeClr>
@@ -18063,7 +16183,7 @@
           <p:spPr bwMode="auto">
             <a:xfrm>
               <a:off x="5033" y="1918"/>
-              <a:ext cx="464" cy="211"/>
+              <a:ext cx="464" cy="214"/>
             </a:xfrm>
             <a:prstGeom prst="rect">
               <a:avLst/>
@@ -18095,7 +16215,7 @@
                 <a:buSzPct val="85000"/>
               </a:pPr>
               <a:r>
-                <a:rPr lang="en-US" sz="800">
+                <a:rPr lang="en-US" sz="800" b="1">
                   <a:latin typeface="Trebuchet MS" pitchFamily="34" charset="0"/>
                 </a:rPr>
                 <a:t>Network</a:t>
@@ -18115,7 +16235,7 @@
                 <a:buSzPct val="85000"/>
               </a:pPr>
               <a:r>
-                <a:rPr lang="en-US" sz="800">
+                <a:rPr lang="en-US" sz="800" b="1">
                   <a:latin typeface="Trebuchet MS" pitchFamily="34" charset="0"/>
                 </a:rPr>
                 <a:t>Dev Kit</a:t>
@@ -18139,12 +16259,10 @@
             <a:prstGeom prst="rect">
               <a:avLst/>
             </a:prstGeom>
-            <a:solidFill>
-              <a:schemeClr val="accent3">
-                <a:lumMod val="40000"/>
-                <a:lumOff val="60000"/>
-              </a:schemeClr>
-            </a:solidFill>
+            <a:blipFill>
+              <a:blip r:embed="rId9" cstate="print"/>
+              <a:tile tx="0" ty="0" sx="100000" sy="100000" flip="none" algn="tl"/>
+            </a:blipFill>
             <a:ln w="9525" algn="ctr">
               <a:solidFill>
                 <a:srgbClr val="808080"/>
@@ -18181,12 +16299,10 @@
             <a:prstGeom prst="rect">
               <a:avLst/>
             </a:prstGeom>
-            <a:solidFill>
-              <a:schemeClr val="accent3">
-                <a:lumMod val="40000"/>
-                <a:lumOff val="60000"/>
-              </a:schemeClr>
-            </a:solidFill>
+            <a:blipFill>
+              <a:blip r:embed="rId9" cstate="print"/>
+              <a:tile tx="0" ty="0" sx="100000" sy="100000" flip="none" algn="tl"/>
+            </a:blipFill>
             <a:ln w="9525" algn="ctr">
               <a:solidFill>
                 <a:srgbClr val="808080"/>
@@ -18218,7 +16334,7 @@
           <p:spPr bwMode="auto">
             <a:xfrm>
               <a:off x="4742" y="2208"/>
-              <a:ext cx="291" cy="127"/>
+              <a:ext cx="291" cy="128"/>
             </a:xfrm>
             <a:prstGeom prst="rect">
               <a:avLst/>
@@ -18250,7 +16366,7 @@
                 <a:buSzPct val="85000"/>
               </a:pPr>
               <a:r>
-                <a:rPr lang="en-US" sz="800">
+                <a:rPr lang="en-US" sz="800" b="1">
                   <a:latin typeface="Trebuchet MS" pitchFamily="34" charset="0"/>
                 </a:rPr>
                 <a:t>IPC</a:t>
@@ -18269,7 +16385,7 @@
           <p:spPr bwMode="auto">
             <a:xfrm>
               <a:off x="4452" y="2208"/>
-              <a:ext cx="291" cy="127"/>
+              <a:ext cx="291" cy="128"/>
             </a:xfrm>
             <a:prstGeom prst="rect">
               <a:avLst/>
@@ -18301,7 +16417,7 @@
                 <a:buSzPct val="85000"/>
               </a:pPr>
               <a:r>
-                <a:rPr lang="en-US" sz="800">
+                <a:rPr lang="en-US" sz="800" b="1">
                   <a:latin typeface="Trebuchet MS" pitchFamily="34" charset="0"/>
                 </a:rPr>
                 <a:t>LLD</a:t>
@@ -18325,12 +16441,10 @@
             <a:prstGeom prst="rect">
               <a:avLst/>
             </a:prstGeom>
-            <a:solidFill>
-              <a:schemeClr val="accent3">
-                <a:lumMod val="40000"/>
-                <a:lumOff val="60000"/>
-              </a:schemeClr>
-            </a:solidFill>
+            <a:blipFill>
+              <a:blip r:embed="rId9" cstate="print"/>
+              <a:tile tx="0" ty="0" sx="100000" sy="100000" flip="none" algn="tl"/>
+            </a:blipFill>
             <a:ln w="9525" algn="ctr">
               <a:solidFill>
                 <a:srgbClr val="808080"/>
@@ -18367,12 +16481,10 @@
             <a:prstGeom prst="rect">
               <a:avLst/>
             </a:prstGeom>
-            <a:solidFill>
-              <a:schemeClr val="accent3">
-                <a:lumMod val="40000"/>
-                <a:lumOff val="60000"/>
-              </a:schemeClr>
-            </a:solidFill>
+            <a:blipFill>
+              <a:blip r:embed="rId9" cstate="print"/>
+              <a:tile tx="0" ty="0" sx="100000" sy="100000" flip="none" algn="tl"/>
+            </a:blipFill>
             <a:ln w="9525" algn="ctr">
               <a:solidFill>
                 <a:srgbClr val="808080"/>
@@ -18404,7 +16516,7 @@
           <p:spPr bwMode="auto">
             <a:xfrm>
               <a:off x="4742" y="1700"/>
-              <a:ext cx="315" cy="196"/>
+              <a:ext cx="315" cy="198"/>
             </a:xfrm>
             <a:prstGeom prst="rect">
               <a:avLst/>
@@ -18436,7 +16548,7 @@
                 <a:buSzPct val="85000"/>
               </a:pPr>
               <a:r>
-                <a:rPr lang="en-US" sz="800">
+                <a:rPr lang="en-US" sz="800" b="1">
                   <a:latin typeface="Trebuchet MS" pitchFamily="34" charset="0"/>
                 </a:rPr>
                 <a:t>EDMA, Etc</a:t>
@@ -18455,7 +16567,7 @@
           <p:spPr bwMode="auto">
             <a:xfrm>
               <a:off x="4452" y="1676"/>
-              <a:ext cx="291" cy="211"/>
+              <a:ext cx="291" cy="214"/>
             </a:xfrm>
             <a:prstGeom prst="rect">
               <a:avLst/>
@@ -18487,7 +16599,7 @@
                 <a:buSzPct val="85000"/>
               </a:pPr>
               <a:r>
-                <a:rPr lang="en-US" sz="800">
+                <a:rPr lang="en-US" sz="800" b="1" dirty="0">
                   <a:latin typeface="Trebuchet MS" pitchFamily="34" charset="0"/>
                 </a:rPr>
                 <a:t>Tools</a:t>
@@ -18507,7 +16619,7 @@
                 <a:buSzPct val="85000"/>
               </a:pPr>
               <a:r>
-                <a:rPr lang="en-US" sz="800">
+                <a:rPr lang="en-US" sz="800" b="1" dirty="0">
                   <a:latin typeface="Trebuchet MS" pitchFamily="34" charset="0"/>
                 </a:rPr>
                 <a:t>(UIA)</a:t>
@@ -18943,33 +17055,15 @@
                                   </p:childTnLst>
                                 </p:cTn>
                               </p:par>
-                            </p:childTnLst>
-                          </p:cTn>
-                        </p:par>
-                      </p:childTnLst>
-                    </p:cTn>
-                  </p:par>
-                  <p:par>
-                    <p:cTn id="15" fill="hold">
-                      <p:stCondLst>
-                        <p:cond delay="indefinite"/>
-                      </p:stCondLst>
-                      <p:childTnLst>
-                        <p:par>
-                          <p:cTn id="16" fill="hold">
-                            <p:stCondLst>
-                              <p:cond delay="0"/>
-                            </p:stCondLst>
-                            <p:childTnLst>
                               <p:par>
-                                <p:cTn id="17" presetID="6" presetClass="entr" presetSubtype="16" fill="hold" grpId="1" nodeType="clickEffect">
+                                <p:cTn id="15" presetID="6" presetClass="entr" presetSubtype="16" fill="hold" grpId="1" nodeType="withEffect">
                                   <p:stCondLst>
                                     <p:cond delay="0"/>
                                   </p:stCondLst>
                                   <p:childTnLst>
                                     <p:set>
                                       <p:cBhvr>
-                                        <p:cTn id="18" dur="1" fill="hold">
+                                        <p:cTn id="16" dur="1" fill="hold">
                                           <p:stCondLst>
                                             <p:cond delay="0"/>
                                           </p:stCondLst>
@@ -18987,7 +17081,7 @@
                                     </p:set>
                                     <p:animEffect transition="in" filter="circle(in)">
                                       <p:cBhvr>
-                                        <p:cTn id="19" dur="2000"/>
+                                        <p:cTn id="17" dur="2000"/>
                                         <p:tgtEl>
                                           <p:spTgt spid="90"/>
                                         </p:tgtEl>
@@ -19003,26 +17097,26 @@
                     </p:cTn>
                   </p:par>
                   <p:par>
-                    <p:cTn id="20" fill="hold">
+                    <p:cTn id="18" fill="hold">
                       <p:stCondLst>
                         <p:cond delay="indefinite"/>
                       </p:stCondLst>
                       <p:childTnLst>
                         <p:par>
-                          <p:cTn id="21" fill="hold">
+                          <p:cTn id="19" fill="hold">
                             <p:stCondLst>
                               <p:cond delay="0"/>
                             </p:stCondLst>
                             <p:childTnLst>
                               <p:par>
-                                <p:cTn id="22" presetID="2" presetClass="entr" presetSubtype="8" fill="hold" nodeType="clickEffect">
+                                <p:cTn id="20" presetID="2" presetClass="entr" presetSubtype="8" fill="hold" nodeType="clickEffect">
                                   <p:stCondLst>
                                     <p:cond delay="0"/>
                                   </p:stCondLst>
                                   <p:childTnLst>
                                     <p:set>
                                       <p:cBhvr>
-                                        <p:cTn id="23" dur="1" fill="hold">
+                                        <p:cTn id="21" dur="1" fill="hold">
                                           <p:stCondLst>
                                             <p:cond delay="0"/>
                                           </p:stCondLst>
@@ -19040,7 +17134,7 @@
                                     </p:set>
                                     <p:anim calcmode="lin" valueType="num">
                                       <p:cBhvr additive="base">
-                                        <p:cTn id="24" dur="500" fill="hold"/>
+                                        <p:cTn id="22" dur="500" fill="hold"/>
                                         <p:tgtEl>
                                           <p:spTgt spid="89"/>
                                         </p:tgtEl>
@@ -19063,7 +17157,7 @@
                                     </p:anim>
                                     <p:anim calcmode="lin" valueType="num">
                                       <p:cBhvr additive="base">
-                                        <p:cTn id="25" dur="500" fill="hold"/>
+                                        <p:cTn id="23" dur="500" fill="hold"/>
                                         <p:tgtEl>
                                           <p:spTgt spid="89"/>
                                         </p:tgtEl>
@@ -19087,33 +17181,15 @@
                                   </p:childTnLst>
                                 </p:cTn>
                               </p:par>
-                            </p:childTnLst>
-                          </p:cTn>
-                        </p:par>
-                      </p:childTnLst>
-                    </p:cTn>
-                  </p:par>
-                  <p:par>
-                    <p:cTn id="26" fill="hold">
-                      <p:stCondLst>
-                        <p:cond delay="indefinite"/>
-                      </p:stCondLst>
-                      <p:childTnLst>
-                        <p:par>
-                          <p:cTn id="27" fill="hold">
-                            <p:stCondLst>
-                              <p:cond delay="0"/>
-                            </p:stCondLst>
-                            <p:childTnLst>
                               <p:par>
-                                <p:cTn id="28" presetID="6" presetClass="entr" presetSubtype="16" fill="hold" grpId="0" nodeType="clickEffect">
+                                <p:cTn id="24" presetID="6" presetClass="entr" presetSubtype="16" fill="hold" grpId="0" nodeType="withEffect">
                                   <p:stCondLst>
                                     <p:cond delay="0"/>
                                   </p:stCondLst>
                                   <p:childTnLst>
                                     <p:set>
                                       <p:cBhvr>
-                                        <p:cTn id="29" dur="1" fill="hold">
+                                        <p:cTn id="25" dur="1" fill="hold">
                                           <p:stCondLst>
                                             <p:cond delay="0"/>
                                           </p:stCondLst>
@@ -19131,7 +17207,7 @@
                                     </p:set>
                                     <p:animEffect transition="in" filter="circle(in)">
                                       <p:cBhvr>
-                                        <p:cTn id="30" dur="2000"/>
+                                        <p:cTn id="26" dur="2000"/>
                                         <p:tgtEl>
                                           <p:spTgt spid="8243"/>
                                         </p:tgtEl>
@@ -19147,26 +17223,26 @@
                     </p:cTn>
                   </p:par>
                   <p:par>
-                    <p:cTn id="31" fill="hold">
+                    <p:cTn id="27" fill="hold">
                       <p:stCondLst>
                         <p:cond delay="indefinite"/>
                       </p:stCondLst>
                       <p:childTnLst>
                         <p:par>
-                          <p:cTn id="32" fill="hold">
+                          <p:cTn id="28" fill="hold">
                             <p:stCondLst>
                               <p:cond delay="0"/>
                             </p:stCondLst>
                             <p:childTnLst>
                               <p:par>
-                                <p:cTn id="33" presetID="2" presetClass="entr" presetSubtype="8" fill="hold" nodeType="clickEffect">
+                                <p:cTn id="29" presetID="2" presetClass="entr" presetSubtype="8" fill="hold" nodeType="clickEffect">
                                   <p:stCondLst>
                                     <p:cond delay="0"/>
                                   </p:stCondLst>
                                   <p:childTnLst>
                                     <p:set>
                                       <p:cBhvr>
-                                        <p:cTn id="34" dur="1" fill="hold">
+                                        <p:cTn id="30" dur="1" fill="hold">
                                           <p:stCondLst>
                                             <p:cond delay="0"/>
                                           </p:stCondLst>
@@ -19184,7 +17260,7 @@
                                     </p:set>
                                     <p:anim calcmode="lin" valueType="num">
                                       <p:cBhvr additive="base">
-                                        <p:cTn id="35" dur="500" fill="hold"/>
+                                        <p:cTn id="31" dur="500" fill="hold"/>
                                         <p:tgtEl>
                                           <p:spTgt spid="5"/>
                                         </p:tgtEl>
@@ -19207,7 +17283,7 @@
                                     </p:anim>
                                     <p:anim calcmode="lin" valueType="num">
                                       <p:cBhvr additive="base">
-                                        <p:cTn id="36" dur="500" fill="hold"/>
+                                        <p:cTn id="32" dur="500" fill="hold"/>
                                         <p:tgtEl>
                                           <p:spTgt spid="5"/>
                                         </p:tgtEl>
@@ -19231,33 +17307,15 @@
                                   </p:childTnLst>
                                 </p:cTn>
                               </p:par>
-                            </p:childTnLst>
-                          </p:cTn>
-                        </p:par>
-                      </p:childTnLst>
-                    </p:cTn>
-                  </p:par>
-                  <p:par>
-                    <p:cTn id="37" fill="hold">
-                      <p:stCondLst>
-                        <p:cond delay="indefinite"/>
-                      </p:stCondLst>
-                      <p:childTnLst>
-                        <p:par>
-                          <p:cTn id="38" fill="hold">
-                            <p:stCondLst>
-                              <p:cond delay="0"/>
-                            </p:stCondLst>
-                            <p:childTnLst>
                               <p:par>
-                                <p:cTn id="39" presetID="6" presetClass="entr" presetSubtype="16" fill="hold" grpId="0" nodeType="clickEffect">
+                                <p:cTn id="33" presetID="6" presetClass="entr" presetSubtype="16" fill="hold" grpId="0" nodeType="withEffect">
                                   <p:stCondLst>
                                     <p:cond delay="0"/>
                                   </p:stCondLst>
                                   <p:childTnLst>
                                     <p:set>
                                       <p:cBhvr>
-                                        <p:cTn id="40" dur="1" fill="hold">
+                                        <p:cTn id="34" dur="1" fill="hold">
                                           <p:stCondLst>
                                             <p:cond delay="0"/>
                                           </p:stCondLst>
@@ -19275,7 +17333,7 @@
                                     </p:set>
                                     <p:animEffect transition="in" filter="circle(in)">
                                       <p:cBhvr>
-                                        <p:cTn id="41" dur="2000"/>
+                                        <p:cTn id="35" dur="2000"/>
                                         <p:tgtEl>
                                           <p:spTgt spid="91"/>
                                         </p:tgtEl>
@@ -19284,24 +17342,15 @@
                                   </p:childTnLst>
                                 </p:cTn>
                               </p:par>
-                            </p:childTnLst>
-                          </p:cTn>
-                        </p:par>
-                        <p:par>
-                          <p:cTn id="42" fill="hold">
-                            <p:stCondLst>
-                              <p:cond delay="2000"/>
-                            </p:stCondLst>
-                            <p:childTnLst>
                               <p:par>
-                                <p:cTn id="43" presetID="10" presetClass="entr" presetSubtype="0" fill="hold" grpId="0" nodeType="afterEffect">
+                                <p:cTn id="36" presetID="10" presetClass="entr" presetSubtype="0" fill="hold" grpId="0" nodeType="withEffect">
                                   <p:stCondLst>
-                                    <p:cond delay="3500"/>
+                                    <p:cond delay="0"/>
                                   </p:stCondLst>
                                   <p:childTnLst>
                                     <p:set>
                                       <p:cBhvr>
-                                        <p:cTn id="44" dur="1" fill="hold">
+                                        <p:cTn id="37" dur="1" fill="hold">
                                           <p:stCondLst>
                                             <p:cond delay="0"/>
                                           </p:stCondLst>
@@ -19319,7 +17368,7 @@
                                     </p:set>
                                     <p:animEffect transition="in" filter="fade">
                                       <p:cBhvr>
-                                        <p:cTn id="45" dur="3000"/>
+                                        <p:cTn id="38" dur="3000"/>
                                         <p:tgtEl>
                                           <p:spTgt spid="99"/>
                                         </p:tgtEl>
@@ -20318,8 +18367,13 @@
               </a:pPr>
               <a:r>
                 <a:rPr lang="en-US" sz="1200" dirty="0"/>
-                <a:t>Chip Support Library</a:t>
+                <a:t>Chip Support </a:t>
               </a:r>
+              <a:r>
+                <a:rPr lang="en-US" sz="1200" dirty="0" smtClean="0"/>
+                <a:t>Library (CSL)</a:t>
+              </a:r>
+              <a:endParaRPr lang="en-US" sz="1200" dirty="0"/>
             </a:p>
           </p:txBody>
         </p:sp>
@@ -22191,13 +20245,14 @@
 
 <file path=ppt/tags/tag39.xml><?xml version="1.0" encoding="utf-8"?>
 <p:tagLst xmlns:a="http://schemas.openxmlformats.org/drawingml/2006/main" xmlns:r="http://schemas.openxmlformats.org/officeDocument/2006/relationships" xmlns:p="http://schemas.openxmlformats.org/presentationml/2006/main">
-  <p:tag name="ARTICULATE_SLIDE_GUID" val="2d9bd46f-3f80-4069-a5d8-63143eea88dd"/>
-  <p:tag name="ELAPSEDTIME" val="5.822"/>
+  <p:tag name="ARTICULATE_SLIDE_GUID" val="50f95bd9-d954-4d8a-abbb-8b8c2de8cb5f"/>
+  <p:tag name="TIMELINE" val="5.41/35.24/59.46"/>
+  <p:tag name="ELAPSEDTIME" val="88.291"/>
   <p:tag name="ARTICULATE_SLIDE_PAUSE" val="0"/>
   <p:tag name="ARTICULATE_NAV_LEVEL" val="1"/>
   <p:tag name="ARTICULATE_PLAYLIST_ID" val="-1"/>
   <p:tag name="ARTICULATE_LOCK_SLIDE" val="0"/>
-  <p:tag name="ARTICULATE_SLIDE_NAV" val="14"/>
+  <p:tag name="ARTICULATE_SLIDE_NAV" val="16"/>
 </p:tagLst>
 </file>
 
@@ -22217,27 +20272,13 @@
 
 <file path=ppt/tags/tag40.xml><?xml version="1.0" encoding="utf-8"?>
 <p:tagLst xmlns:a="http://schemas.openxmlformats.org/drawingml/2006/main" xmlns:r="http://schemas.openxmlformats.org/officeDocument/2006/relationships" xmlns:p="http://schemas.openxmlformats.org/presentationml/2006/main">
-  <p:tag name="ARTICULATE_TITLE_TAG" val="What Are the Benefits of MCSDK?"/>
-  <p:tag name="ARTICULATE_SLIDE_GUID" val="25d9aa9a-80a2-4d0e-b531-858765d2cdc1"/>
-  <p:tag name="ELAPSEDTIME" val="90.64"/>
-  <p:tag name="ARTICULATE_SLIDE_PAUSE" val="0"/>
-  <p:tag name="ARTICULATE_NAV_LEVEL" val="2"/>
-  <p:tag name="ARTICULATE_PLAYLIST_ID" val="-1"/>
-  <p:tag name="ARTICULATE_LOCK_SLIDE" val="0"/>
-  <p:tag name="ARTICULATE_SLIDE_NAV" val="15"/>
+  <p:tag name="ARTICULATE_PUBLISH_MODE" val="2"/>
 </p:tagLst>
 </file>
 
 <file path=ppt/tags/tag41.xml><?xml version="1.0" encoding="utf-8"?>
 <p:tagLst xmlns:a="http://schemas.openxmlformats.org/drawingml/2006/main" xmlns:r="http://schemas.openxmlformats.org/officeDocument/2006/relationships" xmlns:p="http://schemas.openxmlformats.org/presentationml/2006/main">
-  <p:tag name="ARTICULATE_SLIDE_GUID" val="50f95bd9-d954-4d8a-abbb-8b8c2de8cb5f"/>
-  <p:tag name="TIMELINE" val="5.41/35.24/59.46"/>
-  <p:tag name="ELAPSEDTIME" val="88.291"/>
-  <p:tag name="ARTICULATE_SLIDE_PAUSE" val="0"/>
-  <p:tag name="ARTICULATE_NAV_LEVEL" val="1"/>
-  <p:tag name="ARTICULATE_PLAYLIST_ID" val="-1"/>
-  <p:tag name="ARTICULATE_LOCK_SLIDE" val="0"/>
-  <p:tag name="ARTICULATE_SLIDE_NAV" val="16"/>
+  <p:tag name="ARTICULATE_PUBLISH_MODE" val="2"/>
 </p:tagLst>
 </file>
 
@@ -22248,18 +20289,6 @@
 </file>
 
 <file path=ppt/tags/tag43.xml><?xml version="1.0" encoding="utf-8"?>
-<p:tagLst xmlns:a="http://schemas.openxmlformats.org/drawingml/2006/main" xmlns:r="http://schemas.openxmlformats.org/officeDocument/2006/relationships" xmlns:p="http://schemas.openxmlformats.org/presentationml/2006/main">
-  <p:tag name="ARTICULATE_PUBLISH_MODE" val="2"/>
-</p:tagLst>
-</file>
-
-<file path=ppt/tags/tag44.xml><?xml version="1.0" encoding="utf-8"?>
-<p:tagLst xmlns:a="http://schemas.openxmlformats.org/drawingml/2006/main" xmlns:r="http://schemas.openxmlformats.org/officeDocument/2006/relationships" xmlns:p="http://schemas.openxmlformats.org/presentationml/2006/main">
-  <p:tag name="ARTICULATE_PUBLISH_MODE" val="2"/>
-</p:tagLst>
-</file>
-
-<file path=ppt/tags/tag45.xml><?xml version="1.0" encoding="utf-8"?>
 <p:tagLst xmlns:a="http://schemas.openxmlformats.org/drawingml/2006/main" xmlns:r="http://schemas.openxmlformats.org/officeDocument/2006/relationships" xmlns:p="http://schemas.openxmlformats.org/presentationml/2006/main">
   <p:tag name="ARTICULATE_PUBLISH_MODE" val="2"/>
 </p:tagLst>

</xml_diff>